<commit_message>
changes missed to demo 90
</commit_message>
<xml_diff>
--- a/demos/demo-90-configure-management-workstation/docs/demo-90-configure-management-workstation-short.pptx
+++ b/demos/demo-90-configure-management-workstation/docs/demo-90-configure-management-workstation-short.pptx
@@ -258,7 +258,7 @@
           <a:p>
             <a:fld id="{3CA61830-C416-483F-955E-54203C65B711}" type="datetimeFigureOut">
               <a:rPr lang="en-US"/>
-              <a:t>12/8/15</a:t>
+              <a:t>12/10/15</a:t>
             </a:fld>
             <a:endParaRPr/>
           </a:p>
@@ -5653,7 +5653,7 @@
           <a:p>
             <a:fld id="{EFA54ACD-BEB7-4258-A5F3-653792456C00}" type="datetime4">
               <a:rPr lang="en-US" smtClean="0"/>
-              <a:t>December 8, 2015</a:t>
+              <a:t>December 10, 2015</a:t>
             </a:fld>
             <a:endParaRPr/>
           </a:p>
@@ -8149,7 +8149,7 @@
           <a:p>
             <a:fld id="{2399C1EB-F401-4F7B-BD9C-AAA165C9F3D7}" type="datetime4">
               <a:rPr lang="en-US" smtClean="0"/>
-              <a:t>December 8, 2015</a:t>
+              <a:t>December 10, 2015</a:t>
             </a:fld>
             <a:endParaRPr/>
           </a:p>
@@ -8344,7 +8344,7 @@
           <a:p>
             <a:fld id="{ECF1CC87-9C4B-4D13-B529-5EAF641302E2}" type="datetime4">
               <a:rPr lang="en-US" smtClean="0"/>
-              <a:t>December 8, 2015</a:t>
+              <a:t>December 10, 2015</a:t>
             </a:fld>
             <a:endParaRPr/>
           </a:p>
@@ -8647,7 +8647,7 @@
           <a:p>
             <a:fld id="{AEFA413A-E630-4377-B30C-3545E98CC867}" type="datetime4">
               <a:rPr lang="en-US" smtClean="0"/>
-              <a:t>December 8, 2015</a:t>
+              <a:t>December 10, 2015</a:t>
             </a:fld>
             <a:endParaRPr/>
           </a:p>
@@ -9036,7 +9036,7 @@
           <a:p>
             <a:fld id="{2D33DC54-2A66-493A-80B5-8303FBA5D0AD}" type="datetime4">
               <a:rPr lang="en-US" smtClean="0"/>
-              <a:t>December 8, 2015</a:t>
+              <a:t>December 10, 2015</a:t>
             </a:fld>
             <a:endParaRPr/>
           </a:p>
@@ -9181,7 +9181,7 @@
           <a:p>
             <a:fld id="{26B45FFC-9EEF-4E69-85F5-C8F54747804D}" type="datetime4">
               <a:rPr lang="en-US" smtClean="0"/>
-              <a:t>December 8, 2015</a:t>
+              <a:t>December 10, 2015</a:t>
             </a:fld>
             <a:endParaRPr/>
           </a:p>
@@ -9424,7 +9424,7 @@
           <a:p>
             <a:fld id="{684E3265-88A3-4C30-AE11-BFDF645909E9}" type="datetime4">
               <a:rPr lang="en-US" smtClean="0"/>
-              <a:t>December 8, 2015</a:t>
+              <a:t>December 10, 2015</a:t>
             </a:fld>
             <a:endParaRPr/>
           </a:p>
@@ -9542,7 +9542,7 @@
           <a:p>
             <a:fld id="{E9F763D2-AF56-4C60-80C7-7D8FC051005C}" type="datetime4">
               <a:rPr lang="en-US" smtClean="0"/>
-              <a:t>December 8, 2015</a:t>
+              <a:t>December 10, 2015</a:t>
             </a:fld>
             <a:endParaRPr/>
           </a:p>
@@ -9862,7 +9862,7 @@
           <a:p>
             <a:fld id="{905039DC-98B3-47E6-AD46-BA5B72AD8B4A}" type="datetime4">
               <a:rPr lang="en-US" smtClean="0"/>
-              <a:t>December 8, 2015</a:t>
+              <a:t>December 10, 2015</a:t>
             </a:fld>
             <a:endParaRPr/>
           </a:p>
@@ -10315,7 +10315,7 @@
           <a:p>
             <a:fld id="{A48AA38D-5CBD-4E44-A2EB-B3F38A5B8051}" type="datetime4">
               <a:rPr lang="en-US" smtClean="0"/>
-              <a:t>December 8, 2015</a:t>
+              <a:t>December 10, 2015</a:t>
             </a:fld>
             <a:endParaRPr/>
           </a:p>
@@ -13360,7 +13360,7 @@
           <a:p>
             <a:fld id="{8F030E74-B79E-47A7-AA1C-BA3D00CC0B4A}" type="datetime4">
               <a:rPr lang="en-US" smtClean="0"/>
-              <a:t>December 8, 2015</a:t>
+              <a:t>December 10, 2015</a:t>
             </a:fld>
             <a:endParaRPr/>
           </a:p>
@@ -13760,7 +13760,7 @@
           <a:p>
             <a:fld id="{00FDD7F1-9FB6-4CB9-BA1F-25B205B879F3}" type="datetime4">
               <a:rPr lang="en-US" smtClean="0"/>
-              <a:t>December 8, 2015</a:t>
+              <a:t>December 10, 2015</a:t>
             </a:fld>
             <a:endParaRPr/>
           </a:p>
@@ -14370,7 +14370,7 @@
           <a:p>
             <a:fld id="{027D5831-B468-414C-94B5-F04EB43FC0AE}" type="datetime4">
               <a:rPr lang="en-US" smtClean="0"/>
-              <a:t>December 8, 2015</a:t>
+              <a:t>December 10, 2015</a:t>
             </a:fld>
             <a:endParaRPr/>
           </a:p>
@@ -15077,7 +15077,7 @@
           <a:p>
             <a:fld id="{727A18C6-3F10-4266-96C9-5D014F3025B2}" type="datetime4">
               <a:rPr lang="en-US" smtClean="0"/>
-              <a:t>December 8, 2015</a:t>
+              <a:t>December 10, 2015</a:t>
             </a:fld>
             <a:endParaRPr/>
           </a:p>
@@ -15371,7 +15371,7 @@
           <a:p>
             <a:fld id="{A6CB1722-4B46-4353-B583-721651D61489}" type="datetime4">
               <a:rPr lang="en-US" smtClean="0"/>
-              <a:t>December 8, 2015</a:t>
+              <a:t>December 10, 2015</a:t>
             </a:fld>
             <a:endParaRPr/>
           </a:p>
@@ -15666,7 +15666,7 @@
           <a:p>
             <a:fld id="{8B8B1958-F972-48E2-B30C-3D9C71EE7ED1}" type="datetime4">
               <a:rPr lang="en-US" smtClean="0"/>
-              <a:t>December 8, 2015</a:t>
+              <a:t>December 10, 2015</a:t>
             </a:fld>
             <a:endParaRPr/>
           </a:p>
@@ -15944,7 +15944,7 @@
           <a:p>
             <a:fld id="{BF2CF142-9C82-4C83-9B6A-8077B879C1B8}" type="datetime4">
               <a:rPr lang="en-US" smtClean="0"/>
-              <a:t>December 8, 2015</a:t>
+              <a:t>December 10, 2015</a:t>
             </a:fld>
             <a:endParaRPr/>
           </a:p>
@@ -16236,7 +16236,7 @@
           <a:p>
             <a:fld id="{9C259EE5-F25B-4563-AE58-6B042DD986DA}" type="datetime4">
               <a:rPr lang="en-US" smtClean="0"/>
-              <a:t>December 8, 2015</a:t>
+              <a:t>December 10, 2015</a:t>
             </a:fld>
             <a:endParaRPr/>
           </a:p>
@@ -16663,7 +16663,7 @@
           <a:p>
             <a:fld id="{F4CAB0D1-A256-4DFA-8583-35D5EE4CD0DF}" type="datetime4">
               <a:rPr lang="en-US" smtClean="0"/>
-              <a:t>December 8, 2015</a:t>
+              <a:t>December 10, 2015</a:t>
             </a:fld>
             <a:endParaRPr/>
           </a:p>
@@ -17236,7 +17236,7 @@
           <a:p>
             <a:fld id="{B0BBCA58-86AD-4F40-BF66-913A1183EE47}" type="datetime4">
               <a:rPr lang="en-US" smtClean="0"/>
-              <a:t>December 8, 2015</a:t>
+              <a:t>December 10, 2015</a:t>
             </a:fld>
             <a:endParaRPr/>
           </a:p>
@@ -22344,7 +22344,7 @@
           <a:p>
             <a:fld id="{FB395617-A7D9-4AE8-82B6-3D0A191CDCBE}" type="datetime4">
               <a:rPr lang="en-US" smtClean="0"/>
-              <a:t>December 8, 2015</a:t>
+              <a:t>December 10, 2015</a:t>
             </a:fld>
             <a:endParaRPr/>
           </a:p>
@@ -24930,7 +24930,7 @@
           <a:p>
             <a:fld id="{77C6BA28-E443-46F5-AE73-D543F89EF748}" type="datetime4">
               <a:rPr lang="en-US" smtClean="0"/>
-              <a:t>December 8, 2015</a:t>
+              <a:t>December 10, 2015</a:t>
             </a:fld>
             <a:endParaRPr/>
           </a:p>
@@ -25130,7 +25130,7 @@
           <a:p>
             <a:fld id="{1452EE1A-1BE0-474E-808D-00D5A7797660}" type="datetime4">
               <a:rPr lang="en-US" smtClean="0"/>
-              <a:t>December 8, 2015</a:t>
+              <a:t>December 10, 2015</a:t>
             </a:fld>
             <a:endParaRPr/>
           </a:p>
@@ -25623,7 +25623,7 @@
           <a:p>
             <a:fld id="{1D654495-4BF5-4727-99D4-DFD1D0597350}" type="datetime4">
               <a:rPr lang="en-US" smtClean="0"/>
-              <a:t>December 8, 2015</a:t>
+              <a:t>December 10, 2015</a:t>
             </a:fld>
             <a:endParaRPr/>
           </a:p>
@@ -25954,7 +25954,7 @@
           <a:p>
             <a:fld id="{74A90477-F864-462B-BF44-00D67B14D858}" type="datetime4">
               <a:rPr lang="en-US" smtClean="0"/>
-              <a:t>December 8, 2015</a:t>
+              <a:t>December 10, 2015</a:t>
             </a:fld>
             <a:endParaRPr/>
           </a:p>
@@ -26209,7 +26209,7 @@
           <a:p>
             <a:fld id="{16E08157-2DC9-4745-A7A9-7046A8583708}" type="datetime4">
               <a:rPr lang="en-US" smtClean="0"/>
-              <a:t>December 8, 2015</a:t>
+              <a:t>December 10, 2015</a:t>
             </a:fld>
             <a:endParaRPr/>
           </a:p>
@@ -28890,7 +28890,7 @@
           <a:p>
             <a:fld id="{FDD7D378-E709-4062-9715-39E79557A063}" type="datetime4">
               <a:rPr lang="en-US" smtClean="0"/>
-              <a:t>December 8, 2015</a:t>
+              <a:t>December 10, 2015</a:t>
             </a:fld>
             <a:endParaRPr/>
           </a:p>
@@ -33807,7 +33807,7 @@
           <a:p>
             <a:fld id="{C07C5E14-300D-4720-B5FE-54C7D96D4160}" type="datetime4">
               <a:rPr lang="en-US" smtClean="0"/>
-              <a:t>December 8, 2015</a:t>
+              <a:t>December 10, 2015</a:t>
             </a:fld>
             <a:endParaRPr/>
           </a:p>
@@ -36500,7 +36500,7 @@
           <a:p>
             <a:fld id="{BC7BE07D-E945-4DDF-8452-20009392BF2F}" type="datetime4">
               <a:rPr lang="en-US" smtClean="0"/>
-              <a:t>December 8, 2015</a:t>
+              <a:t>December 10, 2015</a:t>
             </a:fld>
             <a:endParaRPr/>
           </a:p>
@@ -36980,7 +36980,7 @@
           <a:p>
             <a:fld id="{65FD8143-BFA3-46F8-9B90-B0E5CFAF7F7C}" type="datetime4">
               <a:rPr lang="en-US" smtClean="0"/>
-              <a:t>December 8, 2015</a:t>
+              <a:t>December 10, 2015</a:t>
             </a:fld>
             <a:endParaRPr/>
           </a:p>
@@ -39767,11 +39767,7 @@
             </a:r>
             <a:r>
               <a:rPr lang="en-US" sz="3200" dirty="0" smtClean="0"/>
-              <a:t>: </a:t>
-            </a:r>
-            <a:r>
-              <a:rPr lang="en-US" sz="3200" dirty="0" smtClean="0"/>
-              <a:t>Install and Configure AWSCLI for use with Eucalyptus</a:t>
+              <a:t>: Install and Configure AWSCLI for use with Eucalyptus</a:t>
             </a:r>
             <a:endParaRPr lang="en-US" sz="3200" dirty="0"/>
           </a:p>
@@ -39894,11 +39890,7 @@
           <a:p>
             <a:r>
               <a:rPr lang="en-US" dirty="0" smtClean="0"/>
-              <a:t>Demonstrate </a:t>
-            </a:r>
-            <a:r>
-              <a:rPr lang="en-US" dirty="0" smtClean="0"/>
-              <a:t>Use</a:t>
+              <a:t>Demonstrate Use</a:t>
             </a:r>
             <a:endParaRPr lang="en-US" dirty="0"/>
           </a:p>
@@ -40017,6 +40009,629 @@
                 <a:cs typeface="Consolas" charset="0"/>
               </a:rPr>
               <a:t> ec2 describe-instances --profile hp-aw2-1-demo-admin --region hp-aw2-1</a:t>
+            </a:r>
+            <a:br>
+              <a:rPr lang="en-US" sz="1600" b="1" dirty="0" smtClean="0">
+                <a:solidFill>
+                  <a:schemeClr val="accent3"/>
+                </a:solidFill>
+                <a:latin typeface="Consolas" charset="0"/>
+                <a:ea typeface="Consolas" charset="0"/>
+                <a:cs typeface="Consolas" charset="0"/>
+              </a:rPr>
+            </a:br>
+            <a:r>
+              <a:rPr lang="en-US" sz="1600" b="1" smtClean="0">
+                <a:solidFill>
+                  <a:schemeClr val="accent3"/>
+                </a:solidFill>
+                <a:latin typeface="Consolas" charset="0"/>
+                <a:ea typeface="Consolas" charset="0"/>
+                <a:cs typeface="Consolas" charset="0"/>
+              </a:rPr>
+              <a:t/>
+            </a:r>
+            <a:br>
+              <a:rPr lang="en-US" sz="1600" b="1" smtClean="0">
+                <a:solidFill>
+                  <a:schemeClr val="accent3"/>
+                </a:solidFill>
+                <a:latin typeface="Consolas" charset="0"/>
+                <a:ea typeface="Consolas" charset="0"/>
+                <a:cs typeface="Consolas" charset="0"/>
+              </a:rPr>
+            </a:br>
+            <a:r>
+              <a:rPr lang="en-US" sz="1600" smtClean="0"/>
+              <a:t># </a:t>
+            </a:r>
+            <a:r>
+              <a:rPr lang="en-US" sz="1600" b="1" dirty="0" err="1">
+                <a:solidFill>
+                  <a:schemeClr val="accent3"/>
+                </a:solidFill>
+                <a:latin typeface="Consolas" charset="0"/>
+                <a:ea typeface="Consolas" charset="0"/>
+                <a:cs typeface="Consolas" charset="0"/>
+              </a:rPr>
+              <a:t>aws</a:t>
+            </a:r>
+            <a:r>
+              <a:rPr lang="en-US" sz="1600" b="1" dirty="0">
+                <a:solidFill>
+                  <a:schemeClr val="accent3"/>
+                </a:solidFill>
+                <a:latin typeface="Consolas" charset="0"/>
+                <a:ea typeface="Consolas" charset="0"/>
+                <a:cs typeface="Consolas" charset="0"/>
+              </a:rPr>
+              <a:t> </a:t>
+            </a:r>
+            <a:r>
+              <a:rPr lang="en-US" sz="1600" b="1" dirty="0" err="1">
+                <a:solidFill>
+                  <a:schemeClr val="accent3"/>
+                </a:solidFill>
+                <a:latin typeface="Consolas" charset="0"/>
+                <a:ea typeface="Consolas" charset="0"/>
+                <a:cs typeface="Consolas" charset="0"/>
+              </a:rPr>
+              <a:t>elb</a:t>
+            </a:r>
+            <a:r>
+              <a:rPr lang="en-US" sz="1600" b="1" dirty="0">
+                <a:solidFill>
+                  <a:schemeClr val="accent3"/>
+                </a:solidFill>
+                <a:latin typeface="Consolas" charset="0"/>
+                <a:ea typeface="Consolas" charset="0"/>
+                <a:cs typeface="Consolas" charset="0"/>
+              </a:rPr>
+              <a:t> describe-load-balancers </a:t>
+            </a:r>
+            <a:r>
+              <a:rPr lang="en-US" sz="1600" b="1" dirty="0" smtClean="0">
+                <a:solidFill>
+                  <a:schemeClr val="accent3"/>
+                </a:solidFill>
+                <a:latin typeface="Consolas" charset="0"/>
+                <a:ea typeface="Consolas" charset="0"/>
+                <a:cs typeface="Consolas" charset="0"/>
+              </a:rPr>
+              <a:t>--</a:t>
+            </a:r>
+            <a:r>
+              <a:rPr lang="en-US" sz="1600" b="1" dirty="0">
+                <a:solidFill>
+                  <a:schemeClr val="accent3"/>
+                </a:solidFill>
+                <a:latin typeface="Consolas" charset="0"/>
+                <a:ea typeface="Consolas" charset="0"/>
+                <a:cs typeface="Consolas" charset="0"/>
+              </a:rPr>
+              <a:t>profile hp-aw2-1-demo-admin --region hp-aw2-1 </a:t>
+            </a:r>
+            <a:r>
+              <a:rPr lang="en-US" sz="1600" b="1" dirty="0" smtClean="0">
+                <a:solidFill>
+                  <a:schemeClr val="accent3"/>
+                </a:solidFill>
+                <a:latin typeface="Consolas" charset="0"/>
+                <a:ea typeface="Consolas" charset="0"/>
+                <a:cs typeface="Consolas" charset="0"/>
+              </a:rPr>
+              <a:t/>
+            </a:r>
+            <a:br>
+              <a:rPr lang="en-US" sz="1600" b="1" dirty="0" smtClean="0">
+                <a:solidFill>
+                  <a:schemeClr val="accent3"/>
+                </a:solidFill>
+                <a:latin typeface="Consolas" charset="0"/>
+                <a:ea typeface="Consolas" charset="0"/>
+                <a:cs typeface="Consolas" charset="0"/>
+              </a:rPr>
+            </a:br>
+            <a:r>
+              <a:rPr lang="en-US" sz="1600" b="1" dirty="0" smtClean="0">
+                <a:solidFill>
+                  <a:schemeClr val="accent3"/>
+                </a:solidFill>
+                <a:latin typeface="Consolas" charset="0"/>
+                <a:ea typeface="Consolas" charset="0"/>
+                <a:cs typeface="Consolas" charset="0"/>
+              </a:rPr>
+              <a:t/>
+            </a:r>
+            <a:br>
+              <a:rPr lang="en-US" sz="1600" b="1" dirty="0" smtClean="0">
+                <a:solidFill>
+                  <a:schemeClr val="accent3"/>
+                </a:solidFill>
+                <a:latin typeface="Consolas" charset="0"/>
+                <a:ea typeface="Consolas" charset="0"/>
+                <a:cs typeface="Consolas" charset="0"/>
+              </a:rPr>
+            </a:br>
+            <a:r>
+              <a:rPr lang="en-US" sz="1600" dirty="0" smtClean="0"/>
+              <a:t># </a:t>
+            </a:r>
+            <a:r>
+              <a:rPr lang="en-US" sz="1600" b="1" dirty="0" err="1">
+                <a:solidFill>
+                  <a:schemeClr val="accent3"/>
+                </a:solidFill>
+                <a:latin typeface="Consolas" charset="0"/>
+                <a:ea typeface="Consolas" charset="0"/>
+                <a:cs typeface="Consolas" charset="0"/>
+              </a:rPr>
+              <a:t>aws</a:t>
+            </a:r>
+            <a:r>
+              <a:rPr lang="en-US" sz="1600" b="1" dirty="0">
+                <a:solidFill>
+                  <a:schemeClr val="accent3"/>
+                </a:solidFill>
+                <a:latin typeface="Consolas" charset="0"/>
+                <a:ea typeface="Consolas" charset="0"/>
+                <a:cs typeface="Consolas" charset="0"/>
+              </a:rPr>
+              <a:t> </a:t>
+            </a:r>
+            <a:r>
+              <a:rPr lang="en-US" sz="1600" b="1" dirty="0" smtClean="0">
+                <a:solidFill>
+                  <a:schemeClr val="accent3"/>
+                </a:solidFill>
+                <a:latin typeface="Consolas" charset="0"/>
+                <a:ea typeface="Consolas" charset="0"/>
+                <a:cs typeface="Consolas" charset="0"/>
+              </a:rPr>
+              <a:t>s3 </a:t>
+            </a:r>
+            <a:r>
+              <a:rPr lang="en-US" sz="1600" b="1" dirty="0" err="1" smtClean="0">
+                <a:solidFill>
+                  <a:schemeClr val="accent3"/>
+                </a:solidFill>
+                <a:latin typeface="Consolas" charset="0"/>
+                <a:ea typeface="Consolas" charset="0"/>
+                <a:cs typeface="Consolas" charset="0"/>
+              </a:rPr>
+              <a:t>ls</a:t>
+            </a:r>
+            <a:r>
+              <a:rPr lang="en-US" sz="1600" b="1" dirty="0" smtClean="0">
+                <a:solidFill>
+                  <a:schemeClr val="accent3"/>
+                </a:solidFill>
+                <a:latin typeface="Consolas" charset="0"/>
+                <a:ea typeface="Consolas" charset="0"/>
+                <a:cs typeface="Consolas" charset="0"/>
+              </a:rPr>
+              <a:t> </a:t>
+            </a:r>
+            <a:r>
+              <a:rPr lang="en-US" sz="1600" b="1" dirty="0">
+                <a:solidFill>
+                  <a:schemeClr val="accent3"/>
+                </a:solidFill>
+                <a:latin typeface="Consolas" charset="0"/>
+                <a:ea typeface="Consolas" charset="0"/>
+                <a:cs typeface="Consolas" charset="0"/>
+              </a:rPr>
+              <a:t>--profile hp-aw2-1-demo-admin --region </a:t>
+            </a:r>
+            <a:r>
+              <a:rPr lang="en-US" sz="1600" b="1" dirty="0" smtClean="0">
+                <a:solidFill>
+                  <a:schemeClr val="accent3"/>
+                </a:solidFill>
+                <a:latin typeface="Consolas" charset="0"/>
+                <a:ea typeface="Consolas" charset="0"/>
+                <a:cs typeface="Consolas" charset="0"/>
+              </a:rPr>
+              <a:t>hp-aw2-1</a:t>
+            </a:r>
+            <a:br>
+              <a:rPr lang="en-US" sz="1600" b="1" dirty="0" smtClean="0">
+                <a:solidFill>
+                  <a:schemeClr val="accent3"/>
+                </a:solidFill>
+                <a:latin typeface="Consolas" charset="0"/>
+                <a:ea typeface="Consolas" charset="0"/>
+                <a:cs typeface="Consolas" charset="0"/>
+              </a:rPr>
+            </a:br>
+            <a:r>
+              <a:rPr lang="en-US" sz="1600" dirty="0" smtClean="0"/>
+              <a:t># </a:t>
+            </a:r>
+            <a:r>
+              <a:rPr lang="en-US" sz="1600" b="1" dirty="0" err="1">
+                <a:solidFill>
+                  <a:schemeClr val="accent3"/>
+                </a:solidFill>
+                <a:latin typeface="Consolas" charset="0"/>
+                <a:ea typeface="Consolas" charset="0"/>
+                <a:cs typeface="Consolas" charset="0"/>
+              </a:rPr>
+              <a:t>aws</a:t>
+            </a:r>
+            <a:r>
+              <a:rPr lang="en-US" sz="1600" b="1" dirty="0">
+                <a:solidFill>
+                  <a:schemeClr val="accent3"/>
+                </a:solidFill>
+                <a:latin typeface="Consolas" charset="0"/>
+                <a:ea typeface="Consolas" charset="0"/>
+                <a:cs typeface="Consolas" charset="0"/>
+              </a:rPr>
+              <a:t> s3 </a:t>
+            </a:r>
+            <a:r>
+              <a:rPr lang="en-US" sz="1600" b="1" dirty="0" err="1">
+                <a:solidFill>
+                  <a:schemeClr val="accent3"/>
+                </a:solidFill>
+                <a:latin typeface="Consolas" charset="0"/>
+                <a:ea typeface="Consolas" charset="0"/>
+                <a:cs typeface="Consolas" charset="0"/>
+              </a:rPr>
+              <a:t>mb</a:t>
+            </a:r>
+            <a:r>
+              <a:rPr lang="en-US" sz="1600" b="1" dirty="0">
+                <a:solidFill>
+                  <a:schemeClr val="accent3"/>
+                </a:solidFill>
+                <a:latin typeface="Consolas" charset="0"/>
+                <a:ea typeface="Consolas" charset="0"/>
+                <a:cs typeface="Consolas" charset="0"/>
+              </a:rPr>
+              <a:t> s3</a:t>
+            </a:r>
+            <a:r>
+              <a:rPr lang="en-US" sz="1600" b="1" dirty="0" smtClean="0">
+                <a:solidFill>
+                  <a:schemeClr val="accent3"/>
+                </a:solidFill>
+                <a:latin typeface="Consolas" charset="0"/>
+                <a:ea typeface="Consolas" charset="0"/>
+                <a:cs typeface="Consolas" charset="0"/>
+              </a:rPr>
+              <a:t>://</a:t>
+            </a:r>
+            <a:r>
+              <a:rPr lang="en-US" sz="1600" b="1" dirty="0" err="1" smtClean="0">
+                <a:solidFill>
+                  <a:schemeClr val="accent3"/>
+                </a:solidFill>
+                <a:latin typeface="Consolas" charset="0"/>
+                <a:ea typeface="Consolas" charset="0"/>
+                <a:cs typeface="Consolas" charset="0"/>
+              </a:rPr>
+              <a:t>mybucket</a:t>
+            </a:r>
+            <a:r>
+              <a:rPr lang="en-US" sz="1600" b="1" dirty="0" smtClean="0">
+                <a:solidFill>
+                  <a:schemeClr val="accent3"/>
+                </a:solidFill>
+                <a:latin typeface="Consolas" charset="0"/>
+                <a:ea typeface="Consolas" charset="0"/>
+                <a:cs typeface="Consolas" charset="0"/>
+              </a:rPr>
+              <a:t> </a:t>
+            </a:r>
+            <a:r>
+              <a:rPr lang="en-US" sz="1600" b="1" dirty="0">
+                <a:solidFill>
+                  <a:schemeClr val="accent3"/>
+                </a:solidFill>
+                <a:latin typeface="Consolas" charset="0"/>
+                <a:ea typeface="Consolas" charset="0"/>
+                <a:cs typeface="Consolas" charset="0"/>
+              </a:rPr>
+              <a:t>--profile hp-aw2-1-demo-admin --region hp-aw2-1 </a:t>
+            </a:r>
+            <a:r>
+              <a:rPr lang="en-US" sz="1600" b="1" dirty="0" smtClean="0">
+                <a:solidFill>
+                  <a:schemeClr val="accent3"/>
+                </a:solidFill>
+                <a:latin typeface="Consolas" charset="0"/>
+                <a:ea typeface="Consolas" charset="0"/>
+                <a:cs typeface="Consolas" charset="0"/>
+              </a:rPr>
+              <a:t/>
+            </a:r>
+            <a:br>
+              <a:rPr lang="en-US" sz="1600" b="1" dirty="0" smtClean="0">
+                <a:solidFill>
+                  <a:schemeClr val="accent3"/>
+                </a:solidFill>
+                <a:latin typeface="Consolas" charset="0"/>
+                <a:ea typeface="Consolas" charset="0"/>
+                <a:cs typeface="Consolas" charset="0"/>
+              </a:rPr>
+            </a:br>
+            <a:r>
+              <a:rPr lang="en-US" sz="1600" b="1" dirty="0" smtClean="0">
+                <a:solidFill>
+                  <a:schemeClr val="accent3"/>
+                </a:solidFill>
+                <a:latin typeface="Consolas" charset="0"/>
+                <a:ea typeface="Consolas" charset="0"/>
+                <a:cs typeface="Consolas" charset="0"/>
+              </a:rPr>
+              <a:t/>
+            </a:r>
+            <a:br>
+              <a:rPr lang="en-US" sz="1600" b="1" dirty="0" smtClean="0">
+                <a:solidFill>
+                  <a:schemeClr val="accent3"/>
+                </a:solidFill>
+                <a:latin typeface="Consolas" charset="0"/>
+                <a:ea typeface="Consolas" charset="0"/>
+                <a:cs typeface="Consolas" charset="0"/>
+              </a:rPr>
+            </a:br>
+            <a:r>
+              <a:rPr lang="en-US" sz="1600" dirty="0" smtClean="0"/>
+              <a:t># </a:t>
+            </a:r>
+            <a:r>
+              <a:rPr lang="en-US" sz="1600" b="1" dirty="0" err="1">
+                <a:solidFill>
+                  <a:schemeClr val="accent3"/>
+                </a:solidFill>
+                <a:latin typeface="Consolas" charset="0"/>
+                <a:ea typeface="Consolas" charset="0"/>
+                <a:cs typeface="Consolas" charset="0"/>
+              </a:rPr>
+              <a:t>aws</a:t>
+            </a:r>
+            <a:r>
+              <a:rPr lang="en-US" sz="1600" b="1" dirty="0">
+                <a:solidFill>
+                  <a:schemeClr val="accent3"/>
+                </a:solidFill>
+                <a:latin typeface="Consolas" charset="0"/>
+                <a:ea typeface="Consolas" charset="0"/>
+                <a:cs typeface="Consolas" charset="0"/>
+              </a:rPr>
+              <a:t> </a:t>
+            </a:r>
+            <a:r>
+              <a:rPr lang="en-US" sz="1600" b="1" dirty="0" err="1" smtClean="0">
+                <a:solidFill>
+                  <a:schemeClr val="accent3"/>
+                </a:solidFill>
+                <a:latin typeface="Consolas" charset="0"/>
+                <a:ea typeface="Consolas" charset="0"/>
+                <a:cs typeface="Consolas" charset="0"/>
+              </a:rPr>
+              <a:t>iam</a:t>
+            </a:r>
+            <a:r>
+              <a:rPr lang="en-US" sz="1600" b="1" dirty="0" smtClean="0">
+                <a:solidFill>
+                  <a:schemeClr val="accent3"/>
+                </a:solidFill>
+                <a:latin typeface="Consolas" charset="0"/>
+                <a:ea typeface="Consolas" charset="0"/>
+                <a:cs typeface="Consolas" charset="0"/>
+              </a:rPr>
+              <a:t> list-users </a:t>
+            </a:r>
+            <a:r>
+              <a:rPr lang="en-US" sz="1600" b="1" dirty="0">
+                <a:solidFill>
+                  <a:schemeClr val="accent3"/>
+                </a:solidFill>
+                <a:latin typeface="Consolas" charset="0"/>
+                <a:ea typeface="Consolas" charset="0"/>
+                <a:cs typeface="Consolas" charset="0"/>
+              </a:rPr>
+              <a:t>--profile hp-aw2-1-demo-admin --region </a:t>
+            </a:r>
+            <a:r>
+              <a:rPr lang="en-US" sz="1600" b="1" dirty="0" smtClean="0">
+                <a:solidFill>
+                  <a:schemeClr val="accent3"/>
+                </a:solidFill>
+                <a:latin typeface="Consolas" charset="0"/>
+                <a:ea typeface="Consolas" charset="0"/>
+                <a:cs typeface="Consolas" charset="0"/>
+              </a:rPr>
+              <a:t>hp-aw2-1</a:t>
+            </a:r>
+            <a:br>
+              <a:rPr lang="en-US" sz="1600" b="1" dirty="0" smtClean="0">
+                <a:solidFill>
+                  <a:schemeClr val="accent3"/>
+                </a:solidFill>
+                <a:latin typeface="Consolas" charset="0"/>
+                <a:ea typeface="Consolas" charset="0"/>
+                <a:cs typeface="Consolas" charset="0"/>
+              </a:rPr>
+            </a:br>
+            <a:r>
+              <a:rPr lang="en-US" sz="1600" dirty="0" smtClean="0"/>
+              <a:t># </a:t>
+            </a:r>
+            <a:r>
+              <a:rPr lang="en-US" sz="1600" b="1" dirty="0" err="1">
+                <a:solidFill>
+                  <a:schemeClr val="accent3"/>
+                </a:solidFill>
+                <a:latin typeface="Consolas" charset="0"/>
+                <a:ea typeface="Consolas" charset="0"/>
+                <a:cs typeface="Consolas" charset="0"/>
+              </a:rPr>
+              <a:t>aws</a:t>
+            </a:r>
+            <a:r>
+              <a:rPr lang="en-US" sz="1600" b="1" dirty="0">
+                <a:solidFill>
+                  <a:schemeClr val="accent3"/>
+                </a:solidFill>
+                <a:latin typeface="Consolas" charset="0"/>
+                <a:ea typeface="Consolas" charset="0"/>
+                <a:cs typeface="Consolas" charset="0"/>
+              </a:rPr>
+              <a:t> </a:t>
+            </a:r>
+            <a:r>
+              <a:rPr lang="en-US" sz="1600" b="1" dirty="0" err="1">
+                <a:solidFill>
+                  <a:schemeClr val="accent3"/>
+                </a:solidFill>
+                <a:latin typeface="Consolas" charset="0"/>
+                <a:ea typeface="Consolas" charset="0"/>
+                <a:cs typeface="Consolas" charset="0"/>
+              </a:rPr>
+              <a:t>iam</a:t>
+            </a:r>
+            <a:r>
+              <a:rPr lang="en-US" sz="1600" b="1" dirty="0">
+                <a:solidFill>
+                  <a:schemeClr val="accent3"/>
+                </a:solidFill>
+                <a:latin typeface="Consolas" charset="0"/>
+                <a:ea typeface="Consolas" charset="0"/>
+                <a:cs typeface="Consolas" charset="0"/>
+              </a:rPr>
+              <a:t> </a:t>
+            </a:r>
+            <a:r>
+              <a:rPr lang="en-US" sz="1600" b="1" dirty="0" smtClean="0">
+                <a:solidFill>
+                  <a:schemeClr val="accent3"/>
+                </a:solidFill>
+                <a:latin typeface="Consolas" charset="0"/>
+                <a:ea typeface="Consolas" charset="0"/>
+                <a:cs typeface="Consolas" charset="0"/>
+              </a:rPr>
+              <a:t>list-groups </a:t>
+            </a:r>
+            <a:r>
+              <a:rPr lang="en-US" sz="1600" b="1" dirty="0">
+                <a:solidFill>
+                  <a:schemeClr val="accent3"/>
+                </a:solidFill>
+                <a:latin typeface="Consolas" charset="0"/>
+                <a:ea typeface="Consolas" charset="0"/>
+                <a:cs typeface="Consolas" charset="0"/>
+              </a:rPr>
+              <a:t>--profile hp-aw2-1-demo-admin --region hp-aw2-1</a:t>
+            </a:r>
+            <a:br>
+              <a:rPr lang="en-US" sz="1600" b="1" dirty="0">
+                <a:solidFill>
+                  <a:schemeClr val="accent3"/>
+                </a:solidFill>
+                <a:latin typeface="Consolas" charset="0"/>
+                <a:ea typeface="Consolas" charset="0"/>
+                <a:cs typeface="Consolas" charset="0"/>
+              </a:rPr>
+            </a:br>
+            <a:r>
+              <a:rPr lang="en-US" sz="1600" b="1" dirty="0">
+                <a:solidFill>
+                  <a:schemeClr val="accent3"/>
+                </a:solidFill>
+                <a:latin typeface="Consolas" charset="0"/>
+                <a:ea typeface="Consolas" charset="0"/>
+                <a:cs typeface="Consolas" charset="0"/>
+              </a:rPr>
+              <a:t/>
+            </a:r>
+            <a:br>
+              <a:rPr lang="en-US" sz="1600" b="1" dirty="0">
+                <a:solidFill>
+                  <a:schemeClr val="accent3"/>
+                </a:solidFill>
+                <a:latin typeface="Consolas" charset="0"/>
+                <a:ea typeface="Consolas" charset="0"/>
+                <a:cs typeface="Consolas" charset="0"/>
+              </a:rPr>
+            </a:br>
+            <a:r>
+              <a:rPr lang="en-US" sz="1600" b="1" dirty="0">
+                <a:latin typeface="Consolas" charset="0"/>
+                <a:ea typeface="Consolas" charset="0"/>
+                <a:cs typeface="Consolas" charset="0"/>
+              </a:rPr>
+              <a:t># </a:t>
+            </a:r>
+            <a:r>
+              <a:rPr lang="en-US" sz="1600" b="1" dirty="0" err="1">
+                <a:solidFill>
+                  <a:schemeClr val="accent3"/>
+                </a:solidFill>
+                <a:latin typeface="Consolas" charset="0"/>
+                <a:ea typeface="Consolas" charset="0"/>
+                <a:cs typeface="Consolas" charset="0"/>
+              </a:rPr>
+              <a:t>aws</a:t>
+            </a:r>
+            <a:r>
+              <a:rPr lang="en-US" sz="1600" b="1" dirty="0">
+                <a:solidFill>
+                  <a:schemeClr val="accent3"/>
+                </a:solidFill>
+                <a:latin typeface="Consolas" charset="0"/>
+                <a:ea typeface="Consolas" charset="0"/>
+                <a:cs typeface="Consolas" charset="0"/>
+              </a:rPr>
+              <a:t> </a:t>
+            </a:r>
+            <a:r>
+              <a:rPr lang="en-US" sz="1600" b="1" dirty="0" err="1">
+                <a:solidFill>
+                  <a:schemeClr val="accent3"/>
+                </a:solidFill>
+                <a:latin typeface="Consolas" charset="0"/>
+                <a:ea typeface="Consolas" charset="0"/>
+                <a:cs typeface="Consolas" charset="0"/>
+              </a:rPr>
+              <a:t>cloudwatch</a:t>
+            </a:r>
+            <a:r>
+              <a:rPr lang="en-US" sz="1600" b="1" dirty="0">
+                <a:solidFill>
+                  <a:schemeClr val="accent3"/>
+                </a:solidFill>
+                <a:latin typeface="Consolas" charset="0"/>
+                <a:ea typeface="Consolas" charset="0"/>
+                <a:cs typeface="Consolas" charset="0"/>
+              </a:rPr>
+              <a:t> describe-alarms </a:t>
+            </a:r>
+            <a:r>
+              <a:rPr lang="en-US" sz="1600" b="1" dirty="0" smtClean="0">
+                <a:solidFill>
+                  <a:schemeClr val="accent3"/>
+                </a:solidFill>
+                <a:latin typeface="Consolas" charset="0"/>
+                <a:ea typeface="Consolas" charset="0"/>
+                <a:cs typeface="Consolas" charset="0"/>
+              </a:rPr>
+              <a:t>--</a:t>
+            </a:r>
+            <a:r>
+              <a:rPr lang="en-US" sz="1600" b="1" dirty="0">
+                <a:solidFill>
+                  <a:schemeClr val="accent3"/>
+                </a:solidFill>
+                <a:latin typeface="Consolas" charset="0"/>
+                <a:ea typeface="Consolas" charset="0"/>
+                <a:cs typeface="Consolas" charset="0"/>
+              </a:rPr>
+              <a:t>profile hp-aw2-1-demo-admin --region hp-aw2-1</a:t>
             </a:r>
           </a:p>
           <a:p>
@@ -40307,20 +40922,44 @@
           <a:p>
             <a:pPr lvl="1"/>
             <a:r>
+              <a:rPr lang="en-US" b="1" dirty="0" smtClean="0">
+                <a:solidFill>
+                  <a:schemeClr val="accent3"/>
+                </a:solidFill>
+              </a:rPr>
+              <a:t>Google: “</a:t>
+            </a:r>
+            <a:r>
+              <a:rPr lang="en-US" b="1" dirty="0" err="1" smtClean="0">
+                <a:solidFill>
+                  <a:schemeClr val="accent3"/>
+                </a:solidFill>
+              </a:rPr>
+              <a:t>euca</a:t>
+            </a:r>
+            <a:r>
+              <a:rPr lang="en-US" b="1" dirty="0" smtClean="0">
+                <a:solidFill>
+                  <a:schemeClr val="accent3"/>
+                </a:solidFill>
+              </a:rPr>
+              <a:t>-demo”.</a:t>
+            </a:r>
+            <a:r>
               <a:rPr lang="en-US" dirty="0" smtClean="0"/>
-              <a:t>Google</a:t>
-            </a:r>
+              <a:t> Then this content inside “demo-90”.</a:t>
+            </a:r>
+            <a:endParaRPr lang="en-US" b="1" dirty="0" smtClean="0">
+              <a:solidFill>
+                <a:schemeClr val="accent3"/>
+              </a:solidFill>
+            </a:endParaRPr>
+          </a:p>
+          <a:p>
+            <a:pPr lvl="2"/>
             <a:r>
               <a:rPr lang="en-US" dirty="0" smtClean="0"/>
-              <a:t>: “</a:t>
-            </a:r>
-            <a:r>
-              <a:rPr lang="en-US" dirty="0" err="1" smtClean="0"/>
-              <a:t>euca</a:t>
-            </a:r>
-            <a:r>
-              <a:rPr lang="en-US" dirty="0" smtClean="0"/>
-              <a:t>-demo”. (4.2 related content currently under “feature/4.2” branch, will move to master once stable.)</a:t>
+              <a:t>4.2 related content currently under “feature/4.2” branch, will move to master once stable.</a:t>
             </a:r>
             <a:endParaRPr lang="en-US" dirty="0"/>
           </a:p>
@@ -40328,11 +40967,7 @@
             <a:pPr lvl="1"/>
             <a:r>
               <a:rPr lang="en-US" dirty="0" smtClean="0"/>
-              <a:t>PowerPoint</a:t>
-            </a:r>
-            <a:r>
-              <a:rPr lang="en-US" dirty="0"/>
-              <a:t>: </a:t>
+              <a:t>PowerPoint Presentation: </a:t>
             </a:r>
             <a:r>
               <a:rPr lang="en-US" dirty="0">
@@ -40351,14 +40986,6 @@
                 <a:hlinkClick r:id="rId2"/>
               </a:rPr>
               <a:t>github.com/eucalyptus/euca-demo/tree/feature/4.2/demos/demo-90-configure-management-workstation/demo-90-configure-management-workstation-short.pptx</a:t>
-            </a:r>
-            <a:r>
-              <a:rPr lang="en-US" dirty="0" smtClean="0">
-                <a:solidFill>
-                  <a:srgbClr val="00B388"/>
-                </a:solidFill>
-              </a:rPr>
-              <a:t> </a:t>
             </a:r>
             <a:endParaRPr lang="en-US" dirty="0" smtClean="0">
               <a:solidFill>
@@ -40370,29 +40997,35 @@
             <a:pPr lvl="1"/>
             <a:r>
               <a:rPr lang="en-US" dirty="0" smtClean="0"/>
-              <a:t>Configure AWSCLI: </a:t>
+              <a:t>Color-Coded _</a:t>
+            </a:r>
+            <a:r>
+              <a:rPr lang="en-US" dirty="0" err="1" smtClean="0"/>
+              <a:t>endpoints.json</a:t>
+            </a:r>
+            <a:r>
+              <a:rPr lang="en-US" dirty="0"/>
+              <a:t> Example: </a:t>
             </a:r>
             <a:r>
               <a:rPr lang="en-US" dirty="0">
-                <a:solidFill>
-                  <a:srgbClr val="00B388"/>
-                </a:solidFill>
-                <a:ea typeface="Consolas" charset="0"/>
-                <a:cs typeface="Consolas" charset="0"/>
                 <a:hlinkClick r:id="rId3"/>
               </a:rPr>
               <a:t>https://</a:t>
             </a:r>
             <a:r>
-              <a:rPr lang="en-US" dirty="0" err="1" smtClean="0">
-                <a:solidFill>
-                  <a:srgbClr val="00B388"/>
-                </a:solidFill>
-                <a:ea typeface="Consolas" charset="0"/>
-                <a:cs typeface="Consolas" charset="0"/>
+              <a:rPr lang="en-US" dirty="0" smtClean="0">
                 <a:hlinkClick r:id="rId3"/>
               </a:rPr>
-              <a:t>github.com</a:t>
+              <a:t>github.com/eucalyptus/euca-demo/blob/feature/4.2/demos/demo-90-configure-management-workstation/docs/demo-90-configure-management-workstation-endpoints-local-ssl.pptx</a:t>
+            </a:r>
+            <a:endParaRPr lang="en-US" dirty="0" smtClean="0"/>
+          </a:p>
+          <a:p>
+            <a:pPr lvl="1"/>
+            <a:r>
+              <a:rPr lang="en-US" dirty="0" smtClean="0"/>
+              <a:t>Configure AWSCLI Detailed Procedure: </a:t>
             </a:r>
             <a:r>
               <a:rPr lang="en-US" dirty="0" smtClean="0">
@@ -40401,33 +41034,11 @@
                 </a:solidFill>
                 <a:ea typeface="Consolas" charset="0"/>
                 <a:cs typeface="Consolas" charset="0"/>
-                <a:hlinkClick r:id="rId3"/>
+                <a:hlinkClick r:id="rId4"/>
               </a:rPr>
-              <a:t>/eucalyptus/</a:t>
-            </a:r>
-            <a:r>
-              <a:rPr lang="en-US" dirty="0" err="1" smtClean="0">
-                <a:solidFill>
-                  <a:srgbClr val="00B388"/>
-                </a:solidFill>
-                <a:ea typeface="Consolas" charset="0"/>
-                <a:cs typeface="Consolas" charset="0"/>
-                <a:hlinkClick r:id="rId3"/>
-              </a:rPr>
-              <a:t>euca</a:t>
-            </a:r>
-            <a:r>
-              <a:rPr lang="en-US" dirty="0" smtClean="0">
-                <a:solidFill>
-                  <a:srgbClr val="00B388"/>
-                </a:solidFill>
-                <a:ea typeface="Consolas" charset="0"/>
-                <a:cs typeface="Consolas" charset="0"/>
-                <a:hlinkClick r:id="rId3"/>
-              </a:rPr>
-              <a:t>-demo/blob/master/installs/install-10-faststart/docs/install-16-faststart-configure-awscli.md</a:t>
-            </a:r>
-            <a:endParaRPr lang="en-US" dirty="0">
+              <a:t>https://github.com/eucalyptus/euca-demo/blob/master/installs/install-10-faststart/docs/install-16-faststart-configure-awscli.md</a:t>
+            </a:r>
+            <a:endParaRPr lang="en-US" dirty="0" smtClean="0">
               <a:solidFill>
                 <a:srgbClr val="00B388"/>
               </a:solidFill>
@@ -40443,22 +41054,42 @@
           <a:p>
             <a:pPr lvl="1"/>
             <a:r>
-              <a:rPr lang="en-US" dirty="0"/>
+              <a:rPr lang="en-US" b="1" dirty="0">
+                <a:solidFill>
+                  <a:schemeClr val="accent3"/>
+                </a:solidFill>
+              </a:rPr>
               <a:t>Google: “</a:t>
             </a:r>
             <a:r>
-              <a:rPr lang="en-US" dirty="0" err="1"/>
+              <a:rPr lang="en-US" b="1" dirty="0" err="1">
+                <a:solidFill>
+                  <a:schemeClr val="accent3"/>
+                </a:solidFill>
+              </a:rPr>
               <a:t>awscli</a:t>
             </a:r>
             <a:r>
-              <a:rPr lang="en-US" dirty="0"/>
+              <a:rPr lang="en-US" b="1" dirty="0">
+                <a:solidFill>
+                  <a:schemeClr val="accent3"/>
+                </a:solidFill>
+              </a:rPr>
               <a:t> install</a:t>
             </a:r>
             <a:r>
-              <a:rPr lang="en-US" dirty="0" smtClean="0"/>
+              <a:rPr lang="en-US" b="1" dirty="0" smtClean="0">
+                <a:solidFill>
+                  <a:schemeClr val="accent3"/>
+                </a:solidFill>
+              </a:rPr>
               <a:t>”.</a:t>
             </a:r>
-            <a:endParaRPr lang="en-US" dirty="0"/>
+            <a:endParaRPr lang="en-US" b="1" dirty="0">
+              <a:solidFill>
+                <a:schemeClr val="accent3"/>
+              </a:solidFill>
+            </a:endParaRPr>
           </a:p>
           <a:p>
             <a:pPr lvl="1"/>
@@ -40471,7 +41102,7 @@
                 <a:solidFill>
                   <a:srgbClr val="00B388"/>
                 </a:solidFill>
-                <a:hlinkClick r:id="rId4"/>
+                <a:hlinkClick r:id="rId5"/>
               </a:rPr>
               <a:t>http://</a:t>
             </a:r>
@@ -40480,7 +41111,7 @@
                 <a:solidFill>
                   <a:srgbClr val="00B388"/>
                 </a:solidFill>
-                <a:hlinkClick r:id="rId4"/>
+                <a:hlinkClick r:id="rId5"/>
               </a:rPr>
               <a:t>docs.aws.amazon.com/cli/latest/userguide/installing.html#install-with-pip</a:t>
             </a:r>
@@ -40655,8 +41286,17 @@
           <a:p>
             <a:r>
               <a:rPr lang="en-US" sz="2000" b="1" dirty="0"/>
-              <a:t>DNS is Configured</a:t>
-            </a:r>
+              <a:t>DNS is </a:t>
+            </a:r>
+            <a:r>
+              <a:rPr lang="en-US" sz="2000" b="1" dirty="0" smtClean="0"/>
+              <a:t>Configured </a:t>
+            </a:r>
+            <a:r>
+              <a:rPr lang="en-US" sz="2000" b="1" baseline="30000" dirty="0" smtClean="0"/>
+              <a:t>*</a:t>
+            </a:r>
+            <a:endParaRPr lang="en-US" sz="2000" b="1" baseline="30000" dirty="0"/>
           </a:p>
           <a:p>
             <a:pPr lvl="1"/>
@@ -40669,21 +41309,78 @@
             <a:pPr lvl="1"/>
             <a:r>
               <a:rPr lang="en-US" dirty="0"/>
-              <a:t>This session will use http://compute.hp-aw2-1.hpcloudsvc.com:8773/ as an example HTTP service endpoint.</a:t>
+              <a:t>This session will use </a:t>
+            </a:r>
+            <a:r>
+              <a:rPr lang="en-US" b="1" dirty="0">
+                <a:solidFill>
+                  <a:schemeClr val="accent3"/>
+                </a:solidFill>
+              </a:rPr>
+              <a:t>http://compute.hp-aw2-1.hpcloudsvc.com:8773/ </a:t>
+            </a:r>
+            <a:r>
+              <a:rPr lang="en-US" dirty="0"/>
+              <a:t>as an example </a:t>
+            </a:r>
+            <a:r>
+              <a:rPr lang="en-US" b="1" dirty="0">
+                <a:solidFill>
+                  <a:schemeClr val="accent3"/>
+                </a:solidFill>
+              </a:rPr>
+              <a:t>HTTP</a:t>
+            </a:r>
+            <a:r>
+              <a:rPr lang="en-US" dirty="0"/>
+              <a:t> service endpoint.</a:t>
             </a:r>
           </a:p>
           <a:p>
             <a:pPr lvl="1"/>
             <a:r>
               <a:rPr lang="en-US" dirty="0"/>
-              <a:t>This session will use https://compute.hp-aw2-1.hpcloudsvc.com/ as an example HTTPS service endpoint.</a:t>
+              <a:t>This session will use </a:t>
+            </a:r>
+            <a:r>
+              <a:rPr lang="en-US" b="1" dirty="0">
+                <a:solidFill>
+                  <a:schemeClr val="accent3"/>
+                </a:solidFill>
+              </a:rPr>
+              <a:t>https://compute.hp-aw2-1.hpcloudsvc.com/ </a:t>
+            </a:r>
+            <a:r>
+              <a:rPr lang="en-US" dirty="0"/>
+              <a:t>as an example </a:t>
+            </a:r>
+            <a:r>
+              <a:rPr lang="en-US" b="1" dirty="0">
+                <a:solidFill>
+                  <a:schemeClr val="accent3"/>
+                </a:solidFill>
+              </a:rPr>
+              <a:t>HTTPS</a:t>
+            </a:r>
+            <a:r>
+              <a:rPr lang="en-US" dirty="0"/>
+              <a:t> service endpoint.</a:t>
             </a:r>
           </a:p>
           <a:p>
             <a:r>
               <a:rPr lang="en-US" sz="2000" b="1" dirty="0"/>
-              <a:t>SSL is Configured with an Internal Certificate Authority</a:t>
-            </a:r>
+              <a:t>SSL is Configured with an Internal Certificate </a:t>
+            </a:r>
+            <a:r>
+              <a:rPr lang="en-US" sz="2000" b="1" dirty="0" smtClean="0"/>
+              <a:t>Authority </a:t>
+            </a:r>
+            <a:r>
+              <a:rPr lang="en-US" sz="2000" b="1" baseline="30000" dirty="0"/>
+              <a:t>*</a:t>
+            </a:r>
+            <a:endParaRPr lang="en-US" sz="2000" b="1" dirty="0"/>
           </a:p>
           <a:p>
             <a:pPr lvl="1"/>
@@ -40693,11 +41390,7 @@
             </a:r>
             <a:r>
               <a:rPr lang="en-US" dirty="0" smtClean="0"/>
-              <a:t>assumes an SSL certificate protecting the API has been signed by an internal CA</a:t>
-            </a:r>
-            <a:r>
-              <a:rPr lang="en-US" dirty="0" smtClean="0"/>
-              <a:t>.</a:t>
+              <a:t>assumes an SSL certificate protecting the API has been signed by an internal CA.</a:t>
             </a:r>
             <a:endParaRPr lang="en-US" dirty="0"/>
           </a:p>
@@ -40729,6 +41422,45 @@
               <a:t>2</a:t>
             </a:fld>
             <a:endParaRPr lang="en-US"/>
+          </a:p>
+        </p:txBody>
+      </p:sp>
+      <p:sp>
+        <p:nvSpPr>
+          <p:cNvPr id="6" name="TextBox 5"/>
+          <p:cNvSpPr txBox="1"/>
+          <p:nvPr/>
+        </p:nvSpPr>
+        <p:spPr>
+          <a:xfrm>
+            <a:off x="615386" y="5867400"/>
+            <a:ext cx="10967013" cy="228600"/>
+          </a:xfrm>
+          <a:prstGeom prst="rect">
+            <a:avLst/>
+          </a:prstGeom>
+          <a:noFill/>
+        </p:spPr>
+        <p:txBody>
+          <a:bodyPr wrap="square" lIns="0" tIns="0" rIns="0" bIns="0" rtlCol="0">
+            <a:noAutofit/>
+          </a:bodyPr>
+          <a:lstStyle/>
+          <a:p>
+            <a:pPr>
+              <a:lnSpc>
+                <a:spcPct val="90000"/>
+              </a:lnSpc>
+            </a:pPr>
+            <a:r>
+              <a:rPr lang="en-US" sz="1200" dirty="0" smtClean="0"/>
+              <a:t>* It’s possible to configure AWSCLI without DNS or SSL using HTTP and the </a:t>
+            </a:r>
+            <a:r>
+              <a:rPr lang="en-US" sz="1200" smtClean="0"/>
+              <a:t>service endpoint IP address.</a:t>
+            </a:r>
+            <a:endParaRPr lang="en-US" sz="1200" dirty="0"/>
           </a:p>
         </p:txBody>
       </p:sp>
@@ -40852,7 +41584,7 @@
           <a:p>
             <a:r>
               <a:rPr lang="en-US" sz="2000" b="1" dirty="0" smtClean="0"/>
-              <a:t>AWS Services initially each had separate CLI (Command-Line Tools)</a:t>
+              <a:t>AWS Services Initially Had Per-Service CLIs (Command-Line Interface)</a:t>
             </a:r>
             <a:endParaRPr lang="en-US" sz="2000" b="1" dirty="0"/>
           </a:p>
@@ -40860,15 +41592,7 @@
             <a:pPr lvl="1"/>
             <a:r>
               <a:rPr lang="en-US" dirty="0" smtClean="0"/>
-              <a:t>There were separate CLIs available for many services such as EC2, ELB, </a:t>
-            </a:r>
-            <a:r>
-              <a:rPr lang="en-US" dirty="0" err="1" smtClean="0"/>
-              <a:t>AutoScaling</a:t>
-            </a:r>
-            <a:r>
-              <a:rPr lang="en-US" dirty="0" smtClean="0"/>
-              <a:t>, </a:t>
+              <a:t>There were separate CLIs available for many services such as EC2, ELB, IAM, </a:t>
             </a:r>
             <a:r>
               <a:rPr lang="en-US" dirty="0" err="1" smtClean="0"/>
@@ -40883,11 +41607,7 @@
             <a:pPr lvl="1"/>
             <a:r>
               <a:rPr lang="en-US" dirty="0" smtClean="0"/>
-              <a:t>Each tool was released on a separate release schedule</a:t>
-            </a:r>
-            <a:r>
-              <a:rPr lang="en-US" dirty="0" smtClean="0"/>
-              <a:t>.</a:t>
+              <a:t>Each tool was released on a separate release schedule.</a:t>
             </a:r>
             <a:endParaRPr lang="en-US" dirty="0"/>
           </a:p>
@@ -41056,15 +41776,7 @@
                   <a:srgbClr val="877B75"/>
                 </a:solidFill>
               </a:rPr>
-              <a:t>Install </a:t>
-            </a:r>
-            <a:r>
-              <a:rPr lang="en-US" dirty="0" smtClean="0">
-                <a:solidFill>
-                  <a:srgbClr val="877B75"/>
-                </a:solidFill>
-              </a:rPr>
-              <a:t>AWSCLI</a:t>
+              <a:t>Install AWSCLI</a:t>
             </a:r>
             <a:endParaRPr lang="en-US" dirty="0">
               <a:solidFill>
@@ -41585,7 +42297,7 @@
               <a:t>pip install </a:t>
             </a:r>
             <a:r>
-              <a:rPr lang="en-US" sz="1400" b="1" dirty="0" err="1">
+              <a:rPr lang="en-US" sz="1400" b="1" dirty="0" err="1" smtClean="0">
                 <a:solidFill>
                   <a:schemeClr val="accent3"/>
                 </a:solidFill>
@@ -41595,11 +42307,64 @@
               </a:rPr>
               <a:t>awscli</a:t>
             </a:r>
-            <a:endParaRPr lang="en-US" sz="1400" b="1" dirty="0">
+            <a:endParaRPr lang="en-US" sz="1400" b="1" dirty="0" smtClean="0">
               <a:solidFill>
                 <a:schemeClr val="accent3"/>
               </a:solidFill>
               <a:latin typeface="Consolas" charset="0"/>
+              <a:ea typeface="Consolas" charset="0"/>
+              <a:cs typeface="Consolas" charset="0"/>
+            </a:endParaRPr>
+          </a:p>
+          <a:p>
+            <a:r>
+              <a:rPr lang="en-US" sz="2000" b="1" dirty="0" smtClean="0"/>
+              <a:t>Windows</a:t>
+            </a:r>
+          </a:p>
+          <a:p>
+            <a:pPr lvl="1"/>
+            <a:r>
+              <a:rPr lang="en-US" sz="1400" dirty="0" smtClean="0"/>
+              <a:t>Download MSI installer which can </a:t>
+            </a:r>
+            <a:r>
+              <a:rPr lang="en-US" sz="1400" dirty="0"/>
+              <a:t>be found here: </a:t>
+            </a:r>
+            <a:r>
+              <a:rPr lang="en-US" sz="1400" dirty="0">
+                <a:solidFill>
+                  <a:schemeClr val="accent3"/>
+                </a:solidFill>
+                <a:hlinkClick r:id="rId2"/>
+              </a:rPr>
+              <a:t>http://</a:t>
+            </a:r>
+            <a:r>
+              <a:rPr lang="en-US" sz="1400" dirty="0" smtClean="0">
+                <a:solidFill>
+                  <a:schemeClr val="accent3"/>
+                </a:solidFill>
+                <a:hlinkClick r:id="rId2"/>
+              </a:rPr>
+              <a:t>docs.aws.amazon.com/cli/latest/userguide/installing.html</a:t>
+            </a:r>
+            <a:r>
+              <a:rPr lang="en-US" sz="1400" dirty="0" smtClean="0"/>
+              <a:t>  </a:t>
+            </a:r>
+            <a:r>
+              <a:rPr lang="en-US" b="1" dirty="0"/>
+              <a:t/>
+            </a:r>
+            <a:br>
+              <a:rPr lang="en-US" b="1" dirty="0"/>
+            </a:br>
+            <a:endParaRPr lang="en-US" b="1" dirty="0">
+              <a:solidFill>
+                <a:schemeClr val="accent3"/>
+              </a:solidFill>
               <a:ea typeface="Consolas" charset="0"/>
               <a:cs typeface="Consolas" charset="0"/>
             </a:endParaRPr>
@@ -41761,12 +42526,8 @@
           <a:lstStyle/>
           <a:p>
             <a:r>
-              <a:rPr lang="en-US" sz="2000" b="1" dirty="0" err="1" smtClean="0"/>
-              <a:t>CentOS</a:t>
-            </a:r>
-            <a:r>
               <a:rPr lang="en-US" sz="2000" b="1" dirty="0" smtClean="0"/>
-              <a:t> System</a:t>
+              <a:t>System</a:t>
             </a:r>
             <a:endParaRPr lang="en-US" sz="2000" b="1" dirty="0"/>
           </a:p>
@@ -41781,29 +42542,7 @@
                 <a:ea typeface="Consolas" charset="0"/>
                 <a:cs typeface="Consolas" charset="0"/>
               </a:rPr>
-              <a:t>/</a:t>
-            </a:r>
-            <a:r>
-              <a:rPr lang="en-US" b="1" dirty="0" err="1">
-                <a:solidFill>
-                  <a:schemeClr val="accent3"/>
-                </a:solidFill>
-                <a:latin typeface="Consolas" charset="0"/>
-                <a:ea typeface="Consolas" charset="0"/>
-                <a:cs typeface="Consolas" charset="0"/>
-              </a:rPr>
-              <a:t>usr</a:t>
-            </a:r>
-            <a:r>
-              <a:rPr lang="en-US" b="1" dirty="0">
-                <a:solidFill>
-                  <a:schemeClr val="accent3"/>
-                </a:solidFill>
-                <a:latin typeface="Consolas" charset="0"/>
-                <a:ea typeface="Consolas" charset="0"/>
-                <a:cs typeface="Consolas" charset="0"/>
-              </a:rPr>
-              <a:t>/lib/python2.6/site-packages/</a:t>
+              <a:t>/usr/lib/python2.6/site-packages/</a:t>
             </a:r>
             <a:r>
               <a:rPr lang="en-US" b="1" dirty="0" err="1">
@@ -41945,7 +42684,116 @@
                 <a:ea typeface="Consolas" charset="0"/>
                 <a:cs typeface="Consolas" charset="0"/>
               </a:rPr>
-              <a:t> (Mac OS X)</a:t>
+              <a:t> (Mac OS X</a:t>
+            </a:r>
+            <a:r>
+              <a:rPr lang="en-US" b="1" dirty="0">
+                <a:solidFill>
+                  <a:schemeClr val="accent3"/>
+                </a:solidFill>
+                <a:latin typeface="Consolas" charset="0"/>
+                <a:ea typeface="Consolas" charset="0"/>
+                <a:cs typeface="Consolas" charset="0"/>
+              </a:rPr>
+              <a:t>)</a:t>
+            </a:r>
+            <a:br>
+              <a:rPr lang="en-US" b="1" dirty="0">
+                <a:solidFill>
+                  <a:schemeClr val="accent3"/>
+                </a:solidFill>
+                <a:latin typeface="Consolas" charset="0"/>
+                <a:ea typeface="Consolas" charset="0"/>
+                <a:cs typeface="Consolas" charset="0"/>
+              </a:rPr>
+            </a:br>
+            <a:r>
+              <a:rPr lang="en-US" b="1" dirty="0">
+                <a:solidFill>
+                  <a:schemeClr val="accent3"/>
+                </a:solidFill>
+                <a:latin typeface="Consolas" charset="0"/>
+                <a:ea typeface="Consolas" charset="0"/>
+                <a:cs typeface="Consolas" charset="0"/>
+              </a:rPr>
+              <a:t>C:\Program </a:t>
+            </a:r>
+            <a:r>
+              <a:rPr lang="en-US" b="1" dirty="0" smtClean="0">
+                <a:solidFill>
+                  <a:schemeClr val="accent3"/>
+                </a:solidFill>
+                <a:latin typeface="Consolas" charset="0"/>
+                <a:ea typeface="Consolas" charset="0"/>
+                <a:cs typeface="Consolas" charset="0"/>
+              </a:rPr>
+              <a:t>Files\Amazon\AWSCLI\</a:t>
+            </a:r>
+            <a:r>
+              <a:rPr lang="en-US" b="1" dirty="0" err="1" smtClean="0">
+                <a:solidFill>
+                  <a:schemeClr val="accent3"/>
+                </a:solidFill>
+                <a:latin typeface="Consolas" charset="0"/>
+                <a:ea typeface="Consolas" charset="0"/>
+                <a:cs typeface="Consolas" charset="0"/>
+              </a:rPr>
+              <a:t>botocore</a:t>
+            </a:r>
+            <a:r>
+              <a:rPr lang="en-US" b="1" dirty="0" smtClean="0">
+                <a:solidFill>
+                  <a:schemeClr val="accent3"/>
+                </a:solidFill>
+                <a:latin typeface="Consolas" charset="0"/>
+                <a:ea typeface="Consolas" charset="0"/>
+                <a:cs typeface="Consolas" charset="0"/>
+              </a:rPr>
+              <a:t>\data\</a:t>
+            </a:r>
+            <a:r>
+              <a:rPr lang="en-US" b="1" dirty="0" err="1" smtClean="0">
+                <a:solidFill>
+                  <a:schemeClr val="accent3"/>
+                </a:solidFill>
+                <a:latin typeface="Consolas" charset="0"/>
+                <a:ea typeface="Consolas" charset="0"/>
+                <a:cs typeface="Consolas" charset="0"/>
+              </a:rPr>
+              <a:t>aws</a:t>
+            </a:r>
+            <a:r>
+              <a:rPr lang="en-US" b="1" dirty="0">
+                <a:solidFill>
+                  <a:schemeClr val="accent3"/>
+                </a:solidFill>
+                <a:latin typeface="Consolas" charset="0"/>
+                <a:ea typeface="Consolas" charset="0"/>
+                <a:cs typeface="Consolas" charset="0"/>
+              </a:rPr>
+              <a:t>\_</a:t>
+            </a:r>
+            <a:r>
+              <a:rPr lang="en-US" b="1" dirty="0" err="1" smtClean="0">
+                <a:solidFill>
+                  <a:schemeClr val="accent3"/>
+                </a:solidFill>
+                <a:latin typeface="Consolas" charset="0"/>
+                <a:ea typeface="Consolas" charset="0"/>
+                <a:cs typeface="Consolas" charset="0"/>
+              </a:rPr>
+              <a:t>endpoints.json</a:t>
+            </a:r>
+            <a:r>
+              <a:rPr lang="en-US" b="1" dirty="0" smtClean="0">
+                <a:solidFill>
+                  <a:schemeClr val="accent3"/>
+                </a:solidFill>
+                <a:latin typeface="Consolas" charset="0"/>
+                <a:ea typeface="Consolas" charset="0"/>
+                <a:cs typeface="Consolas" charset="0"/>
+              </a:rPr>
+              <a:t> (Windows)</a:t>
             </a:r>
             <a:endParaRPr lang="en-US" b="1" dirty="0">
               <a:solidFill>
@@ -41960,11 +42808,7 @@
             <a:pPr lvl="2"/>
             <a:r>
               <a:rPr lang="en-US" dirty="0" smtClean="0"/>
-              <a:t>Contains </a:t>
-            </a:r>
-            <a:r>
-              <a:rPr lang="en-US" dirty="0" smtClean="0"/>
-              <a:t>definitions of all AWS region endpoints. We can modify this to add Eucalyptus region endpoints.</a:t>
+              <a:t>Contains definitions of all AWS region endpoints. We can modify this to add Eucalyptus region endpoints.</a:t>
             </a:r>
             <a:endParaRPr lang="en-US" dirty="0"/>
           </a:p>
@@ -41982,17 +42826,6 @@
               <a:t>/</a:t>
             </a:r>
             <a:r>
-              <a:rPr lang="en-US" b="1" dirty="0" err="1" smtClean="0">
-                <a:solidFill>
-                  <a:schemeClr val="accent3"/>
-                </a:solidFill>
-                <a:latin typeface="Consolas" charset="0"/>
-                <a:ea typeface="Consolas" charset="0"/>
-                <a:cs typeface="Consolas" charset="0"/>
-              </a:rPr>
-              <a:t>usr</a:t>
-            </a:r>
-            <a:r>
               <a:rPr lang="en-US" b="1" dirty="0" smtClean="0">
                 <a:solidFill>
                   <a:schemeClr val="accent3"/>
@@ -42001,7 +42834,7 @@
                 <a:ea typeface="Consolas" charset="0"/>
                 <a:cs typeface="Consolas" charset="0"/>
               </a:rPr>
-              <a:t>/lib/python2.6/site-packages/</a:t>
+              <a:t>usr/lib/python2.6/site-packages/</a:t>
             </a:r>
             <a:r>
               <a:rPr lang="en-US" b="1" dirty="0" err="1" smtClean="0">
@@ -42187,7 +43020,116 @@
                 <a:ea typeface="Consolas" charset="0"/>
                 <a:cs typeface="Consolas" charset="0"/>
               </a:rPr>
-              <a:t> (Mac OS X)</a:t>
+              <a:t> (Mac OS X</a:t>
+            </a:r>
+            <a:r>
+              <a:rPr lang="en-US" b="1" dirty="0">
+                <a:solidFill>
+                  <a:schemeClr val="accent3"/>
+                </a:solidFill>
+                <a:latin typeface="Consolas" charset="0"/>
+                <a:ea typeface="Consolas" charset="0"/>
+                <a:cs typeface="Consolas" charset="0"/>
+              </a:rPr>
+              <a:t>)</a:t>
+            </a:r>
+            <a:br>
+              <a:rPr lang="en-US" b="1" dirty="0">
+                <a:solidFill>
+                  <a:schemeClr val="accent3"/>
+                </a:solidFill>
+                <a:latin typeface="Consolas" charset="0"/>
+                <a:ea typeface="Consolas" charset="0"/>
+                <a:cs typeface="Consolas" charset="0"/>
+              </a:rPr>
+            </a:br>
+            <a:r>
+              <a:rPr lang="en-US" b="1" dirty="0">
+                <a:solidFill>
+                  <a:schemeClr val="accent3"/>
+                </a:solidFill>
+                <a:latin typeface="Consolas" charset="0"/>
+                <a:ea typeface="Consolas" charset="0"/>
+                <a:cs typeface="Consolas" charset="0"/>
+              </a:rPr>
+              <a:t>C:\Program </a:t>
+            </a:r>
+            <a:r>
+              <a:rPr lang="en-US" b="1" dirty="0" smtClean="0">
+                <a:solidFill>
+                  <a:schemeClr val="accent3"/>
+                </a:solidFill>
+                <a:latin typeface="Consolas" charset="0"/>
+                <a:ea typeface="Consolas" charset="0"/>
+                <a:cs typeface="Consolas" charset="0"/>
+              </a:rPr>
+              <a:t>Files\Amazon\AWSCLI\</a:t>
+            </a:r>
+            <a:r>
+              <a:rPr lang="en-US" b="1" dirty="0" err="1" smtClean="0">
+                <a:solidFill>
+                  <a:schemeClr val="accent3"/>
+                </a:solidFill>
+                <a:latin typeface="Consolas" charset="0"/>
+                <a:ea typeface="Consolas" charset="0"/>
+                <a:cs typeface="Consolas" charset="0"/>
+              </a:rPr>
+              <a:t>botocore</a:t>
+            </a:r>
+            <a:r>
+              <a:rPr lang="en-US" b="1" dirty="0" smtClean="0">
+                <a:solidFill>
+                  <a:schemeClr val="accent3"/>
+                </a:solidFill>
+                <a:latin typeface="Consolas" charset="0"/>
+                <a:ea typeface="Consolas" charset="0"/>
+                <a:cs typeface="Consolas" charset="0"/>
+              </a:rPr>
+              <a:t>\</a:t>
+            </a:r>
+            <a:r>
+              <a:rPr lang="en-US" b="1" dirty="0" err="1" smtClean="0">
+                <a:solidFill>
+                  <a:schemeClr val="accent3"/>
+                </a:solidFill>
+                <a:latin typeface="Consolas" charset="0"/>
+                <a:ea typeface="Consolas" charset="0"/>
+                <a:cs typeface="Consolas" charset="0"/>
+              </a:rPr>
+              <a:t>vendored</a:t>
+            </a:r>
+            <a:r>
+              <a:rPr lang="en-US" b="1" dirty="0" smtClean="0">
+                <a:solidFill>
+                  <a:schemeClr val="accent3"/>
+                </a:solidFill>
+                <a:latin typeface="Consolas" charset="0"/>
+                <a:ea typeface="Consolas" charset="0"/>
+                <a:cs typeface="Consolas" charset="0"/>
+              </a:rPr>
+              <a:t>\requests\</a:t>
+            </a:r>
+            <a:r>
+              <a:rPr lang="en-US" b="1" dirty="0" err="1" smtClean="0">
+                <a:solidFill>
+                  <a:schemeClr val="accent3"/>
+                </a:solidFill>
+                <a:latin typeface="Consolas" charset="0"/>
+                <a:ea typeface="Consolas" charset="0"/>
+                <a:cs typeface="Consolas" charset="0"/>
+              </a:rPr>
+              <a:t>cacert.pem</a:t>
+            </a:r>
+            <a:r>
+              <a:rPr lang="en-US" b="1" dirty="0" smtClean="0">
+                <a:solidFill>
+                  <a:schemeClr val="accent3"/>
+                </a:solidFill>
+                <a:latin typeface="Consolas" charset="0"/>
+                <a:ea typeface="Consolas" charset="0"/>
+                <a:cs typeface="Consolas" charset="0"/>
+              </a:rPr>
+              <a:t> (Windows)</a:t>
             </a:r>
             <a:endParaRPr lang="en-US" b="1" dirty="0">
               <a:solidFill>
@@ -42202,11 +43144,7 @@
             <a:pPr lvl="2"/>
             <a:r>
               <a:rPr lang="en-US" dirty="0" smtClean="0"/>
-              <a:t>Contains </a:t>
-            </a:r>
-            <a:r>
-              <a:rPr lang="en-US" dirty="0" smtClean="0"/>
-              <a:t>list of trusted CA certs. We can modify this to add any local CA certs used to sign SSL certificates used with Eucalyptus.</a:t>
+              <a:t>Contains list of trusted CA certs. We can modify this to add any local CA certs used to sign SSL certificates used with Eucalyptus.</a:t>
             </a:r>
             <a:endParaRPr lang="en-US" dirty="0"/>
           </a:p>
@@ -42334,11 +43272,7 @@
             </a:r>
             <a:r>
               <a:rPr lang="en-US" dirty="0" smtClean="0"/>
-              <a:t>access-id and secret-key</a:t>
-            </a:r>
-            <a:r>
-              <a:rPr lang="en-US" dirty="0" smtClean="0"/>
-              <a:t>.</a:t>
+              <a:t>access-id and secret-key.</a:t>
             </a:r>
             <a:endParaRPr lang="en-US" b="1" dirty="0"/>
           </a:p>
@@ -45059,7 +45993,7 @@
                 <a:ea typeface="Consolas" charset="0"/>
                 <a:cs typeface="Consolas" charset="0"/>
               </a:rPr>
-              <a:t>Append any CA certificates used to sign the SSL certificate securing the UFS endpoints.</a:t>
+              <a:t>Append any CA certificates used to sign the SSL certificate securing the UFS endpoints in PEM format.</a:t>
             </a:r>
           </a:p>
           <a:p>
@@ -45069,7 +46003,7 @@
                 <a:ea typeface="Consolas" charset="0"/>
                 <a:cs typeface="Consolas" charset="0"/>
               </a:rPr>
-              <a:t>Optional, only needed if SSL certificate issued by an internal, non-globally known Certificate Authority.</a:t>
+              <a:t>Optional – only needed if SSL certificate issued by an internal, non-globally known Certificate Authority.</a:t>
             </a:r>
             <a:endParaRPr lang="en-US" dirty="0">
               <a:ea typeface="Consolas" charset="0"/>
@@ -45194,15 +46128,7 @@
                   <a:srgbClr val="877B75"/>
                 </a:solidFill>
               </a:rPr>
-              <a:t>Configure AWSCLI Eucalyptus Demo Account </a:t>
-            </a:r>
-            <a:r>
-              <a:rPr lang="en-US" dirty="0" smtClean="0">
-                <a:solidFill>
-                  <a:srgbClr val="877B75"/>
-                </a:solidFill>
-              </a:rPr>
-              <a:t>User</a:t>
+              <a:t>Configure AWSCLI Eucalyptus Demo Account User</a:t>
             </a:r>
             <a:endParaRPr lang="en-US" dirty="0">
               <a:solidFill>

</xml_diff>

<commit_message>
cleaned up font sizing and added two more example documents
</commit_message>
<xml_diff>
--- a/demos/demo-90-configure-management-workstation/docs/demo-90-configure-management-workstation-short.pptx
+++ b/demos/demo-90-configure-management-workstation/docs/demo-90-configure-management-workstation-short.pptx
@@ -258,7 +258,7 @@
           <a:p>
             <a:fld id="{3CA61830-C416-483F-955E-54203C65B711}" type="datetimeFigureOut">
               <a:rPr lang="en-US"/>
-              <a:t>12/10/15</a:t>
+              <a:t>2/18/16</a:t>
             </a:fld>
             <a:endParaRPr/>
           </a:p>
@@ -5653,7 +5653,7 @@
           <a:p>
             <a:fld id="{EFA54ACD-BEB7-4258-A5F3-653792456C00}" type="datetime4">
               <a:rPr lang="en-US" smtClean="0"/>
-              <a:t>December 10, 2015</a:t>
+              <a:t>February 18, 2016</a:t>
             </a:fld>
             <a:endParaRPr/>
           </a:p>
@@ -8149,7 +8149,7 @@
           <a:p>
             <a:fld id="{2399C1EB-F401-4F7B-BD9C-AAA165C9F3D7}" type="datetime4">
               <a:rPr lang="en-US" smtClean="0"/>
-              <a:t>December 10, 2015</a:t>
+              <a:t>February 18, 2016</a:t>
             </a:fld>
             <a:endParaRPr/>
           </a:p>
@@ -8344,7 +8344,7 @@
           <a:p>
             <a:fld id="{ECF1CC87-9C4B-4D13-B529-5EAF641302E2}" type="datetime4">
               <a:rPr lang="en-US" smtClean="0"/>
-              <a:t>December 10, 2015</a:t>
+              <a:t>February 18, 2016</a:t>
             </a:fld>
             <a:endParaRPr/>
           </a:p>
@@ -8647,7 +8647,7 @@
           <a:p>
             <a:fld id="{AEFA413A-E630-4377-B30C-3545E98CC867}" type="datetime4">
               <a:rPr lang="en-US" smtClean="0"/>
-              <a:t>December 10, 2015</a:t>
+              <a:t>February 18, 2016</a:t>
             </a:fld>
             <a:endParaRPr/>
           </a:p>
@@ -9036,7 +9036,7 @@
           <a:p>
             <a:fld id="{2D33DC54-2A66-493A-80B5-8303FBA5D0AD}" type="datetime4">
               <a:rPr lang="en-US" smtClean="0"/>
-              <a:t>December 10, 2015</a:t>
+              <a:t>February 18, 2016</a:t>
             </a:fld>
             <a:endParaRPr/>
           </a:p>
@@ -9181,7 +9181,7 @@
           <a:p>
             <a:fld id="{26B45FFC-9EEF-4E69-85F5-C8F54747804D}" type="datetime4">
               <a:rPr lang="en-US" smtClean="0"/>
-              <a:t>December 10, 2015</a:t>
+              <a:t>February 18, 2016</a:t>
             </a:fld>
             <a:endParaRPr/>
           </a:p>
@@ -9424,7 +9424,7 @@
           <a:p>
             <a:fld id="{684E3265-88A3-4C30-AE11-BFDF645909E9}" type="datetime4">
               <a:rPr lang="en-US" smtClean="0"/>
-              <a:t>December 10, 2015</a:t>
+              <a:t>February 18, 2016</a:t>
             </a:fld>
             <a:endParaRPr/>
           </a:p>
@@ -9542,7 +9542,7 @@
           <a:p>
             <a:fld id="{E9F763D2-AF56-4C60-80C7-7D8FC051005C}" type="datetime4">
               <a:rPr lang="en-US" smtClean="0"/>
-              <a:t>December 10, 2015</a:t>
+              <a:t>February 18, 2016</a:t>
             </a:fld>
             <a:endParaRPr/>
           </a:p>
@@ -9862,7 +9862,7 @@
           <a:p>
             <a:fld id="{905039DC-98B3-47E6-AD46-BA5B72AD8B4A}" type="datetime4">
               <a:rPr lang="en-US" smtClean="0"/>
-              <a:t>December 10, 2015</a:t>
+              <a:t>February 18, 2016</a:t>
             </a:fld>
             <a:endParaRPr/>
           </a:p>
@@ -10315,7 +10315,7 @@
           <a:p>
             <a:fld id="{A48AA38D-5CBD-4E44-A2EB-B3F38A5B8051}" type="datetime4">
               <a:rPr lang="en-US" smtClean="0"/>
-              <a:t>December 10, 2015</a:t>
+              <a:t>February 18, 2016</a:t>
             </a:fld>
             <a:endParaRPr/>
           </a:p>
@@ -13360,7 +13360,7 @@
           <a:p>
             <a:fld id="{8F030E74-B79E-47A7-AA1C-BA3D00CC0B4A}" type="datetime4">
               <a:rPr lang="en-US" smtClean="0"/>
-              <a:t>December 10, 2015</a:t>
+              <a:t>February 18, 2016</a:t>
             </a:fld>
             <a:endParaRPr/>
           </a:p>
@@ -13760,7 +13760,7 @@
           <a:p>
             <a:fld id="{00FDD7F1-9FB6-4CB9-BA1F-25B205B879F3}" type="datetime4">
               <a:rPr lang="en-US" smtClean="0"/>
-              <a:t>December 10, 2015</a:t>
+              <a:t>February 18, 2016</a:t>
             </a:fld>
             <a:endParaRPr/>
           </a:p>
@@ -14370,7 +14370,7 @@
           <a:p>
             <a:fld id="{027D5831-B468-414C-94B5-F04EB43FC0AE}" type="datetime4">
               <a:rPr lang="en-US" smtClean="0"/>
-              <a:t>December 10, 2015</a:t>
+              <a:t>February 18, 2016</a:t>
             </a:fld>
             <a:endParaRPr/>
           </a:p>
@@ -15077,7 +15077,7 @@
           <a:p>
             <a:fld id="{727A18C6-3F10-4266-96C9-5D014F3025B2}" type="datetime4">
               <a:rPr lang="en-US" smtClean="0"/>
-              <a:t>December 10, 2015</a:t>
+              <a:t>February 18, 2016</a:t>
             </a:fld>
             <a:endParaRPr/>
           </a:p>
@@ -15371,7 +15371,7 @@
           <a:p>
             <a:fld id="{A6CB1722-4B46-4353-B583-721651D61489}" type="datetime4">
               <a:rPr lang="en-US" smtClean="0"/>
-              <a:t>December 10, 2015</a:t>
+              <a:t>February 18, 2016</a:t>
             </a:fld>
             <a:endParaRPr/>
           </a:p>
@@ -15666,7 +15666,7 @@
           <a:p>
             <a:fld id="{8B8B1958-F972-48E2-B30C-3D9C71EE7ED1}" type="datetime4">
               <a:rPr lang="en-US" smtClean="0"/>
-              <a:t>December 10, 2015</a:t>
+              <a:t>February 18, 2016</a:t>
             </a:fld>
             <a:endParaRPr/>
           </a:p>
@@ -15944,7 +15944,7 @@
           <a:p>
             <a:fld id="{BF2CF142-9C82-4C83-9B6A-8077B879C1B8}" type="datetime4">
               <a:rPr lang="en-US" smtClean="0"/>
-              <a:t>December 10, 2015</a:t>
+              <a:t>February 18, 2016</a:t>
             </a:fld>
             <a:endParaRPr/>
           </a:p>
@@ -16236,7 +16236,7 @@
           <a:p>
             <a:fld id="{9C259EE5-F25B-4563-AE58-6B042DD986DA}" type="datetime4">
               <a:rPr lang="en-US" smtClean="0"/>
-              <a:t>December 10, 2015</a:t>
+              <a:t>February 18, 2016</a:t>
             </a:fld>
             <a:endParaRPr/>
           </a:p>
@@ -16663,7 +16663,7 @@
           <a:p>
             <a:fld id="{F4CAB0D1-A256-4DFA-8583-35D5EE4CD0DF}" type="datetime4">
               <a:rPr lang="en-US" smtClean="0"/>
-              <a:t>December 10, 2015</a:t>
+              <a:t>February 18, 2016</a:t>
             </a:fld>
             <a:endParaRPr/>
           </a:p>
@@ -17236,7 +17236,7 @@
           <a:p>
             <a:fld id="{B0BBCA58-86AD-4F40-BF66-913A1183EE47}" type="datetime4">
               <a:rPr lang="en-US" smtClean="0"/>
-              <a:t>December 10, 2015</a:t>
+              <a:t>February 18, 2016</a:t>
             </a:fld>
             <a:endParaRPr/>
           </a:p>
@@ -22344,7 +22344,7 @@
           <a:p>
             <a:fld id="{FB395617-A7D9-4AE8-82B6-3D0A191CDCBE}" type="datetime4">
               <a:rPr lang="en-US" smtClean="0"/>
-              <a:t>December 10, 2015</a:t>
+              <a:t>February 18, 2016</a:t>
             </a:fld>
             <a:endParaRPr/>
           </a:p>
@@ -24930,7 +24930,7 @@
           <a:p>
             <a:fld id="{77C6BA28-E443-46F5-AE73-D543F89EF748}" type="datetime4">
               <a:rPr lang="en-US" smtClean="0"/>
-              <a:t>December 10, 2015</a:t>
+              <a:t>February 18, 2016</a:t>
             </a:fld>
             <a:endParaRPr/>
           </a:p>
@@ -25130,7 +25130,7 @@
           <a:p>
             <a:fld id="{1452EE1A-1BE0-474E-808D-00D5A7797660}" type="datetime4">
               <a:rPr lang="en-US" smtClean="0"/>
-              <a:t>December 10, 2015</a:t>
+              <a:t>February 18, 2016</a:t>
             </a:fld>
             <a:endParaRPr/>
           </a:p>
@@ -25623,7 +25623,7 @@
           <a:p>
             <a:fld id="{1D654495-4BF5-4727-99D4-DFD1D0597350}" type="datetime4">
               <a:rPr lang="en-US" smtClean="0"/>
-              <a:t>December 10, 2015</a:t>
+              <a:t>February 18, 2016</a:t>
             </a:fld>
             <a:endParaRPr/>
           </a:p>
@@ -25954,7 +25954,7 @@
           <a:p>
             <a:fld id="{74A90477-F864-462B-BF44-00D67B14D858}" type="datetime4">
               <a:rPr lang="en-US" smtClean="0"/>
-              <a:t>December 10, 2015</a:t>
+              <a:t>February 18, 2016</a:t>
             </a:fld>
             <a:endParaRPr/>
           </a:p>
@@ -26209,7 +26209,7 @@
           <a:p>
             <a:fld id="{16E08157-2DC9-4745-A7A9-7046A8583708}" type="datetime4">
               <a:rPr lang="en-US" smtClean="0"/>
-              <a:t>December 10, 2015</a:t>
+              <a:t>February 18, 2016</a:t>
             </a:fld>
             <a:endParaRPr/>
           </a:p>
@@ -28890,7 +28890,7 @@
           <a:p>
             <a:fld id="{FDD7D378-E709-4062-9715-39E79557A063}" type="datetime4">
               <a:rPr lang="en-US" smtClean="0"/>
-              <a:t>December 10, 2015</a:t>
+              <a:t>February 18, 2016</a:t>
             </a:fld>
             <a:endParaRPr/>
           </a:p>
@@ -33807,7 +33807,7 @@
           <a:p>
             <a:fld id="{C07C5E14-300D-4720-B5FE-54C7D96D4160}" type="datetime4">
               <a:rPr lang="en-US" smtClean="0"/>
-              <a:t>December 10, 2015</a:t>
+              <a:t>February 18, 2016</a:t>
             </a:fld>
             <a:endParaRPr/>
           </a:p>
@@ -36500,7 +36500,7 @@
           <a:p>
             <a:fld id="{BC7BE07D-E945-4DDF-8452-20009392BF2F}" type="datetime4">
               <a:rPr lang="en-US" smtClean="0"/>
-              <a:t>December 10, 2015</a:t>
+              <a:t>February 18, 2016</a:t>
             </a:fld>
             <a:endParaRPr/>
           </a:p>
@@ -36980,7 +36980,7 @@
           <a:p>
             <a:fld id="{65FD8143-BFA3-46F8-9B90-B0E5CFAF7F7C}" type="datetime4">
               <a:rPr lang="en-US" smtClean="0"/>
-              <a:t>December 10, 2015</a:t>
+              <a:t>February 18, 2016</a:t>
             </a:fld>
             <a:endParaRPr/>
           </a:p>
@@ -39818,7 +39818,7 @@
           <a:p>
             <a:r>
               <a:rPr lang="en-US" dirty="0" smtClean="0"/>
-              <a:t>December, 2015</a:t>
+              <a:t>February, 2016</a:t>
             </a:r>
             <a:endParaRPr lang="en-US" dirty="0"/>
           </a:p>
@@ -39952,11 +39952,15 @@
               <a:rPr lang="en-US" dirty="0" smtClean="0"/>
             </a:br>
             <a:r>
-              <a:rPr lang="en-US" sz="1600" dirty="0" smtClean="0"/>
+              <a:rPr lang="en-US" sz="1400" b="1" dirty="0" smtClean="0">
+                <a:latin typeface="Consolas" charset="0"/>
+                <a:ea typeface="Consolas" charset="0"/>
+                <a:cs typeface="Consolas" charset="0"/>
+              </a:rPr>
               <a:t># </a:t>
             </a:r>
             <a:r>
-              <a:rPr lang="en-US" sz="1600" b="1" dirty="0" err="1" smtClean="0">
+              <a:rPr lang="en-US" sz="1400" b="1" dirty="0" err="1" smtClean="0">
                 <a:solidFill>
                   <a:schemeClr val="accent3"/>
                 </a:solidFill>
@@ -39967,7 +39971,7 @@
               <a:t>aws</a:t>
             </a:r>
             <a:r>
-              <a:rPr lang="en-US" sz="1600" b="1" dirty="0" smtClean="0">
+              <a:rPr lang="en-US" sz="1400" b="1" dirty="0" smtClean="0">
                 <a:solidFill>
                   <a:schemeClr val="accent3"/>
                 </a:solidFill>
@@ -39978,18 +39982,30 @@
               <a:t> ec2 describe-key-pairs --profile hp-aw2-1-demo-admin --region hp-aw2-1</a:t>
             </a:r>
             <a:r>
-              <a:rPr lang="en-US" sz="1600" dirty="0" smtClean="0"/>
+              <a:rPr lang="en-US" sz="1400" b="1" dirty="0" smtClean="0">
+                <a:latin typeface="Consolas" charset="0"/>
+                <a:ea typeface="Consolas" charset="0"/>
+                <a:cs typeface="Consolas" charset="0"/>
+              </a:rPr>
               <a:t/>
             </a:r>
             <a:br>
-              <a:rPr lang="en-US" sz="1600" dirty="0" smtClean="0"/>
+              <a:rPr lang="en-US" sz="1400" b="1" dirty="0" smtClean="0">
+                <a:latin typeface="Consolas" charset="0"/>
+                <a:ea typeface="Consolas" charset="0"/>
+                <a:cs typeface="Consolas" charset="0"/>
+              </a:rPr>
             </a:br>
             <a:r>
-              <a:rPr lang="en-US" sz="1600" dirty="0" smtClean="0"/>
+              <a:rPr lang="en-US" sz="1400" b="1" dirty="0" smtClean="0">
+                <a:latin typeface="Consolas" charset="0"/>
+                <a:ea typeface="Consolas" charset="0"/>
+                <a:cs typeface="Consolas" charset="0"/>
+              </a:rPr>
               <a:t># </a:t>
             </a:r>
             <a:r>
-              <a:rPr lang="en-US" sz="1600" b="1" dirty="0" err="1" smtClean="0">
+              <a:rPr lang="en-US" sz="1400" b="1" dirty="0" err="1" smtClean="0">
                 <a:solidFill>
                   <a:schemeClr val="accent3"/>
                 </a:solidFill>
@@ -40000,7 +40016,7 @@
               <a:t>aws</a:t>
             </a:r>
             <a:r>
-              <a:rPr lang="en-US" sz="1600" b="1" dirty="0" smtClean="0">
+              <a:rPr lang="en-US" sz="1400" b="1" dirty="0" smtClean="0">
                 <a:solidFill>
                   <a:schemeClr val="accent3"/>
                 </a:solidFill>
@@ -40011,7 +40027,7 @@
               <a:t> ec2 describe-instances --profile hp-aw2-1-demo-admin --region hp-aw2-1</a:t>
             </a:r>
             <a:br>
-              <a:rPr lang="en-US" sz="1600" b="1" dirty="0" smtClean="0">
+              <a:rPr lang="en-US" sz="1400" b="1" dirty="0" smtClean="0">
                 <a:solidFill>
                   <a:schemeClr val="accent3"/>
                 </a:solidFill>
@@ -40021,7 +40037,7 @@
               </a:rPr>
             </a:br>
             <a:r>
-              <a:rPr lang="en-US" sz="1600" b="1" smtClean="0">
+              <a:rPr lang="en-US" sz="1400" b="1" dirty="0" smtClean="0">
                 <a:solidFill>
                   <a:schemeClr val="accent3"/>
                 </a:solidFill>
@@ -40032,7 +40048,7 @@
               <a:t/>
             </a:r>
             <a:br>
-              <a:rPr lang="en-US" sz="1600" b="1" smtClean="0">
+              <a:rPr lang="en-US" sz="1400" b="1" dirty="0" smtClean="0">
                 <a:solidFill>
                   <a:schemeClr val="accent3"/>
                 </a:solidFill>
@@ -40042,11 +40058,15 @@
               </a:rPr>
             </a:br>
             <a:r>
-              <a:rPr lang="en-US" sz="1600" smtClean="0"/>
+              <a:rPr lang="en-US" sz="1400" b="1" dirty="0" smtClean="0">
+                <a:latin typeface="Consolas" charset="0"/>
+                <a:ea typeface="Consolas" charset="0"/>
+                <a:cs typeface="Consolas" charset="0"/>
+              </a:rPr>
               <a:t># </a:t>
             </a:r>
             <a:r>
-              <a:rPr lang="en-US" sz="1600" b="1" dirty="0" err="1">
+              <a:rPr lang="en-US" sz="1400" b="1" dirty="0" err="1">
                 <a:solidFill>
                   <a:schemeClr val="accent3"/>
                 </a:solidFill>
@@ -40057,7 +40077,7 @@
               <a:t>aws</a:t>
             </a:r>
             <a:r>
-              <a:rPr lang="en-US" sz="1600" b="1" dirty="0">
+              <a:rPr lang="en-US" sz="1400" b="1" dirty="0">
                 <a:solidFill>
                   <a:schemeClr val="accent3"/>
                 </a:solidFill>
@@ -40068,7 +40088,7 @@
               <a:t> </a:t>
             </a:r>
             <a:r>
-              <a:rPr lang="en-US" sz="1600" b="1" dirty="0" err="1">
+              <a:rPr lang="en-US" sz="1400" b="1" dirty="0" err="1">
                 <a:solidFill>
                   <a:schemeClr val="accent3"/>
                 </a:solidFill>
@@ -40079,7 +40099,7 @@
               <a:t>elb</a:t>
             </a:r>
             <a:r>
-              <a:rPr lang="en-US" sz="1600" b="1" dirty="0">
+              <a:rPr lang="en-US" sz="1400" b="1" dirty="0">
                 <a:solidFill>
                   <a:schemeClr val="accent3"/>
                 </a:solidFill>
@@ -40090,7 +40110,7 @@
               <a:t> describe-load-balancers </a:t>
             </a:r>
             <a:r>
-              <a:rPr lang="en-US" sz="1600" b="1" dirty="0" smtClean="0">
+              <a:rPr lang="en-US" sz="1400" b="1" dirty="0" smtClean="0">
                 <a:solidFill>
                   <a:schemeClr val="accent3"/>
                 </a:solidFill>
@@ -40101,7 +40121,7 @@
               <a:t>--</a:t>
             </a:r>
             <a:r>
-              <a:rPr lang="en-US" sz="1600" b="1" dirty="0">
+              <a:rPr lang="en-US" sz="1400" b="1" dirty="0">
                 <a:solidFill>
                   <a:schemeClr val="accent3"/>
                 </a:solidFill>
@@ -40112,7 +40132,7 @@
               <a:t>profile hp-aw2-1-demo-admin --region hp-aw2-1 </a:t>
             </a:r>
             <a:r>
-              <a:rPr lang="en-US" sz="1600" b="1" dirty="0" smtClean="0">
+              <a:rPr lang="en-US" sz="1400" b="1" dirty="0" smtClean="0">
                 <a:solidFill>
                   <a:schemeClr val="accent3"/>
                 </a:solidFill>
@@ -40123,7 +40143,7 @@
               <a:t/>
             </a:r>
             <a:br>
-              <a:rPr lang="en-US" sz="1600" b="1" dirty="0" smtClean="0">
+              <a:rPr lang="en-US" sz="1400" b="1" dirty="0" smtClean="0">
                 <a:solidFill>
                   <a:schemeClr val="accent3"/>
                 </a:solidFill>
@@ -40133,7 +40153,7 @@
               </a:rPr>
             </a:br>
             <a:r>
-              <a:rPr lang="en-US" sz="1600" b="1" dirty="0" smtClean="0">
+              <a:rPr lang="en-US" sz="1400" b="1" dirty="0" smtClean="0">
                 <a:solidFill>
                   <a:schemeClr val="accent3"/>
                 </a:solidFill>
@@ -40144,7 +40164,7 @@
               <a:t/>
             </a:r>
             <a:br>
-              <a:rPr lang="en-US" sz="1600" b="1" dirty="0" smtClean="0">
+              <a:rPr lang="en-US" sz="1400" b="1" dirty="0" smtClean="0">
                 <a:solidFill>
                   <a:schemeClr val="accent3"/>
                 </a:solidFill>
@@ -40154,11 +40174,15 @@
               </a:rPr>
             </a:br>
             <a:r>
-              <a:rPr lang="en-US" sz="1600" dirty="0" smtClean="0"/>
+              <a:rPr lang="en-US" sz="1400" b="1" dirty="0" smtClean="0">
+                <a:latin typeface="Consolas" charset="0"/>
+                <a:ea typeface="Consolas" charset="0"/>
+                <a:cs typeface="Consolas" charset="0"/>
+              </a:rPr>
               <a:t># </a:t>
             </a:r>
             <a:r>
-              <a:rPr lang="en-US" sz="1600" b="1" dirty="0" err="1">
+              <a:rPr lang="en-US" sz="1400" b="1" dirty="0" err="1">
                 <a:solidFill>
                   <a:schemeClr val="accent3"/>
                 </a:solidFill>
@@ -40169,7 +40193,7 @@
               <a:t>aws</a:t>
             </a:r>
             <a:r>
-              <a:rPr lang="en-US" sz="1600" b="1" dirty="0">
+              <a:rPr lang="en-US" sz="1400" b="1" dirty="0">
                 <a:solidFill>
                   <a:schemeClr val="accent3"/>
                 </a:solidFill>
@@ -40180,7 +40204,7 @@
               <a:t> </a:t>
             </a:r>
             <a:r>
-              <a:rPr lang="en-US" sz="1600" b="1" dirty="0" smtClean="0">
+              <a:rPr lang="en-US" sz="1400" b="1" dirty="0" smtClean="0">
                 <a:solidFill>
                   <a:schemeClr val="accent3"/>
                 </a:solidFill>
@@ -40188,10 +40212,10 @@
                 <a:ea typeface="Consolas" charset="0"/>
                 <a:cs typeface="Consolas" charset="0"/>
               </a:rPr>
-              <a:t>s3 </a:t>
-            </a:r>
-            <a:r>
-              <a:rPr lang="en-US" sz="1600" b="1" dirty="0" err="1" smtClean="0">
+              <a:t>s3 ls </a:t>
+            </a:r>
+            <a:r>
+              <a:rPr lang="en-US" sz="1400" b="1" dirty="0">
                 <a:solidFill>
                   <a:schemeClr val="accent3"/>
                 </a:solidFill>
@@ -40199,10 +40223,105 @@
                 <a:ea typeface="Consolas" charset="0"/>
                 <a:cs typeface="Consolas" charset="0"/>
               </a:rPr>
-              <a:t>ls</a:t>
-            </a:r>
-            <a:r>
-              <a:rPr lang="en-US" sz="1600" b="1" dirty="0" smtClean="0">
+              <a:t>--profile hp-aw2-1-demo-admin --region </a:t>
+            </a:r>
+            <a:r>
+              <a:rPr lang="en-US" sz="1400" b="1" dirty="0" smtClean="0">
+                <a:solidFill>
+                  <a:schemeClr val="accent3"/>
+                </a:solidFill>
+                <a:latin typeface="Consolas" charset="0"/>
+                <a:ea typeface="Consolas" charset="0"/>
+                <a:cs typeface="Consolas" charset="0"/>
+              </a:rPr>
+              <a:t>hp-aw2-1</a:t>
+            </a:r>
+            <a:br>
+              <a:rPr lang="en-US" sz="1400" b="1" dirty="0" smtClean="0">
+                <a:solidFill>
+                  <a:schemeClr val="accent3"/>
+                </a:solidFill>
+                <a:latin typeface="Consolas" charset="0"/>
+                <a:ea typeface="Consolas" charset="0"/>
+                <a:cs typeface="Consolas" charset="0"/>
+              </a:rPr>
+            </a:br>
+            <a:r>
+              <a:rPr lang="en-US" sz="1400" b="1" dirty="0" smtClean="0">
+                <a:latin typeface="Consolas" charset="0"/>
+                <a:ea typeface="Consolas" charset="0"/>
+                <a:cs typeface="Consolas" charset="0"/>
+              </a:rPr>
+              <a:t># </a:t>
+            </a:r>
+            <a:r>
+              <a:rPr lang="en-US" sz="1400" b="1" dirty="0" err="1">
+                <a:solidFill>
+                  <a:schemeClr val="accent3"/>
+                </a:solidFill>
+                <a:latin typeface="Consolas" charset="0"/>
+                <a:ea typeface="Consolas" charset="0"/>
+                <a:cs typeface="Consolas" charset="0"/>
+              </a:rPr>
+              <a:t>aws</a:t>
+            </a:r>
+            <a:r>
+              <a:rPr lang="en-US" sz="1400" b="1" dirty="0">
+                <a:solidFill>
+                  <a:schemeClr val="accent3"/>
+                </a:solidFill>
+                <a:latin typeface="Consolas" charset="0"/>
+                <a:ea typeface="Consolas" charset="0"/>
+                <a:cs typeface="Consolas" charset="0"/>
+              </a:rPr>
+              <a:t> s3 </a:t>
+            </a:r>
+            <a:r>
+              <a:rPr lang="en-US" sz="1400" b="1" dirty="0" err="1">
+                <a:solidFill>
+                  <a:schemeClr val="accent3"/>
+                </a:solidFill>
+                <a:latin typeface="Consolas" charset="0"/>
+                <a:ea typeface="Consolas" charset="0"/>
+                <a:cs typeface="Consolas" charset="0"/>
+              </a:rPr>
+              <a:t>mb</a:t>
+            </a:r>
+            <a:r>
+              <a:rPr lang="en-US" sz="1400" b="1" dirty="0">
+                <a:solidFill>
+                  <a:schemeClr val="accent3"/>
+                </a:solidFill>
+                <a:latin typeface="Consolas" charset="0"/>
+                <a:ea typeface="Consolas" charset="0"/>
+                <a:cs typeface="Consolas" charset="0"/>
+              </a:rPr>
+              <a:t> s3</a:t>
+            </a:r>
+            <a:r>
+              <a:rPr lang="en-US" sz="1400" b="1" dirty="0" smtClean="0">
+                <a:solidFill>
+                  <a:schemeClr val="accent3"/>
+                </a:solidFill>
+                <a:latin typeface="Consolas" charset="0"/>
+                <a:ea typeface="Consolas" charset="0"/>
+                <a:cs typeface="Consolas" charset="0"/>
+              </a:rPr>
+              <a:t>://</a:t>
+            </a:r>
+            <a:r>
+              <a:rPr lang="en-US" sz="1400" b="1" dirty="0" err="1" smtClean="0">
+                <a:solidFill>
+                  <a:schemeClr val="accent3"/>
+                </a:solidFill>
+                <a:latin typeface="Consolas" charset="0"/>
+                <a:ea typeface="Consolas" charset="0"/>
+                <a:cs typeface="Consolas" charset="0"/>
+              </a:rPr>
+              <a:t>mybucket</a:t>
+            </a:r>
+            <a:r>
+              <a:rPr lang="en-US" sz="1400" b="1" dirty="0" smtClean="0">
                 <a:solidFill>
                   <a:schemeClr val="accent3"/>
                 </a:solidFill>
@@ -40213,7 +40332,112 @@
               <a:t> </a:t>
             </a:r>
             <a:r>
-              <a:rPr lang="en-US" sz="1600" b="1" dirty="0">
+              <a:rPr lang="en-US" sz="1400" b="1" dirty="0">
+                <a:solidFill>
+                  <a:schemeClr val="accent3"/>
+                </a:solidFill>
+                <a:latin typeface="Consolas" charset="0"/>
+                <a:ea typeface="Consolas" charset="0"/>
+                <a:cs typeface="Consolas" charset="0"/>
+              </a:rPr>
+              <a:t>--profile hp-aw2-1-demo-admin --region hp-aw2-1 </a:t>
+            </a:r>
+            <a:r>
+              <a:rPr lang="en-US" sz="1400" b="1" dirty="0" smtClean="0">
+                <a:solidFill>
+                  <a:schemeClr val="accent3"/>
+                </a:solidFill>
+                <a:latin typeface="Consolas" charset="0"/>
+                <a:ea typeface="Consolas" charset="0"/>
+                <a:cs typeface="Consolas" charset="0"/>
+              </a:rPr>
+              <a:t/>
+            </a:r>
+            <a:br>
+              <a:rPr lang="en-US" sz="1400" b="1" dirty="0" smtClean="0">
+                <a:solidFill>
+                  <a:schemeClr val="accent3"/>
+                </a:solidFill>
+                <a:latin typeface="Consolas" charset="0"/>
+                <a:ea typeface="Consolas" charset="0"/>
+                <a:cs typeface="Consolas" charset="0"/>
+              </a:rPr>
+            </a:br>
+            <a:r>
+              <a:rPr lang="en-US" sz="1400" b="1" dirty="0" smtClean="0">
+                <a:solidFill>
+                  <a:schemeClr val="accent3"/>
+                </a:solidFill>
+                <a:latin typeface="Consolas" charset="0"/>
+                <a:ea typeface="Consolas" charset="0"/>
+                <a:cs typeface="Consolas" charset="0"/>
+              </a:rPr>
+              <a:t/>
+            </a:r>
+            <a:br>
+              <a:rPr lang="en-US" sz="1400" b="1" dirty="0" smtClean="0">
+                <a:solidFill>
+                  <a:schemeClr val="accent3"/>
+                </a:solidFill>
+                <a:latin typeface="Consolas" charset="0"/>
+                <a:ea typeface="Consolas" charset="0"/>
+                <a:cs typeface="Consolas" charset="0"/>
+              </a:rPr>
+            </a:br>
+            <a:r>
+              <a:rPr lang="en-US" sz="1400" b="1" dirty="0" smtClean="0">
+                <a:latin typeface="Consolas" charset="0"/>
+                <a:ea typeface="Consolas" charset="0"/>
+                <a:cs typeface="Consolas" charset="0"/>
+              </a:rPr>
+              <a:t># </a:t>
+            </a:r>
+            <a:r>
+              <a:rPr lang="en-US" sz="1400" b="1" dirty="0" err="1">
+                <a:solidFill>
+                  <a:schemeClr val="accent3"/>
+                </a:solidFill>
+                <a:latin typeface="Consolas" charset="0"/>
+                <a:ea typeface="Consolas" charset="0"/>
+                <a:cs typeface="Consolas" charset="0"/>
+              </a:rPr>
+              <a:t>aws</a:t>
+            </a:r>
+            <a:r>
+              <a:rPr lang="en-US" sz="1400" b="1" dirty="0">
+                <a:solidFill>
+                  <a:schemeClr val="accent3"/>
+                </a:solidFill>
+                <a:latin typeface="Consolas" charset="0"/>
+                <a:ea typeface="Consolas" charset="0"/>
+                <a:cs typeface="Consolas" charset="0"/>
+              </a:rPr>
+              <a:t> </a:t>
+            </a:r>
+            <a:r>
+              <a:rPr lang="en-US" sz="1400" b="1" dirty="0" err="1" smtClean="0">
+                <a:solidFill>
+                  <a:schemeClr val="accent3"/>
+                </a:solidFill>
+                <a:latin typeface="Consolas" charset="0"/>
+                <a:ea typeface="Consolas" charset="0"/>
+                <a:cs typeface="Consolas" charset="0"/>
+              </a:rPr>
+              <a:t>iam</a:t>
+            </a:r>
+            <a:r>
+              <a:rPr lang="en-US" sz="1400" b="1" dirty="0" smtClean="0">
+                <a:solidFill>
+                  <a:schemeClr val="accent3"/>
+                </a:solidFill>
+                <a:latin typeface="Consolas" charset="0"/>
+                <a:ea typeface="Consolas" charset="0"/>
+                <a:cs typeface="Consolas" charset="0"/>
+              </a:rPr>
+              <a:t> list-users </a:t>
+            </a:r>
+            <a:r>
+              <a:rPr lang="en-US" sz="1400" b="1" dirty="0">
                 <a:solidFill>
                   <a:schemeClr val="accent3"/>
                 </a:solidFill>
@@ -40224,7 +40448,7 @@
               <a:t>--profile hp-aw2-1-demo-admin --region </a:t>
             </a:r>
             <a:r>
-              <a:rPr lang="en-US" sz="1600" b="1" dirty="0" smtClean="0">
+              <a:rPr lang="en-US" sz="1400" b="1" dirty="0" smtClean="0">
                 <a:solidFill>
                   <a:schemeClr val="accent3"/>
                 </a:solidFill>
@@ -40235,7 +40459,7 @@
               <a:t>hp-aw2-1</a:t>
             </a:r>
             <a:br>
-              <a:rPr lang="en-US" sz="1600" b="1" dirty="0" smtClean="0">
+              <a:rPr lang="en-US" sz="1400" b="1" dirty="0" smtClean="0">
                 <a:solidFill>
                   <a:schemeClr val="accent3"/>
                 </a:solidFill>
@@ -40245,11 +40469,15 @@
               </a:rPr>
             </a:br>
             <a:r>
-              <a:rPr lang="en-US" sz="1600" dirty="0" smtClean="0"/>
+              <a:rPr lang="en-US" sz="1400" b="1" dirty="0" smtClean="0">
+                <a:latin typeface="Consolas" charset="0"/>
+                <a:ea typeface="Consolas" charset="0"/>
+                <a:cs typeface="Consolas" charset="0"/>
+              </a:rPr>
               <a:t># </a:t>
             </a:r>
             <a:r>
-              <a:rPr lang="en-US" sz="1600" b="1" dirty="0" err="1">
+              <a:rPr lang="en-US" sz="1400" b="1" dirty="0" err="1">
                 <a:solidFill>
                   <a:schemeClr val="accent3"/>
                 </a:solidFill>
@@ -40260,62 +40488,7 @@
               <a:t>aws</a:t>
             </a:r>
             <a:r>
-              <a:rPr lang="en-US" sz="1600" b="1" dirty="0">
-                <a:solidFill>
-                  <a:schemeClr val="accent3"/>
-                </a:solidFill>
-                <a:latin typeface="Consolas" charset="0"/>
-                <a:ea typeface="Consolas" charset="0"/>
-                <a:cs typeface="Consolas" charset="0"/>
-              </a:rPr>
-              <a:t> s3 </a:t>
-            </a:r>
-            <a:r>
-              <a:rPr lang="en-US" sz="1600" b="1" dirty="0" err="1">
-                <a:solidFill>
-                  <a:schemeClr val="accent3"/>
-                </a:solidFill>
-                <a:latin typeface="Consolas" charset="0"/>
-                <a:ea typeface="Consolas" charset="0"/>
-                <a:cs typeface="Consolas" charset="0"/>
-              </a:rPr>
-              <a:t>mb</a:t>
-            </a:r>
-            <a:r>
-              <a:rPr lang="en-US" sz="1600" b="1" dirty="0">
-                <a:solidFill>
-                  <a:schemeClr val="accent3"/>
-                </a:solidFill>
-                <a:latin typeface="Consolas" charset="0"/>
-                <a:ea typeface="Consolas" charset="0"/>
-                <a:cs typeface="Consolas" charset="0"/>
-              </a:rPr>
-              <a:t> s3</a:t>
-            </a:r>
-            <a:r>
-              <a:rPr lang="en-US" sz="1600" b="1" dirty="0" smtClean="0">
-                <a:solidFill>
-                  <a:schemeClr val="accent3"/>
-                </a:solidFill>
-                <a:latin typeface="Consolas" charset="0"/>
-                <a:ea typeface="Consolas" charset="0"/>
-                <a:cs typeface="Consolas" charset="0"/>
-              </a:rPr>
-              <a:t>://</a:t>
-            </a:r>
-            <a:r>
-              <a:rPr lang="en-US" sz="1600" b="1" dirty="0" err="1" smtClean="0">
-                <a:solidFill>
-                  <a:schemeClr val="accent3"/>
-                </a:solidFill>
-                <a:latin typeface="Consolas" charset="0"/>
-                <a:ea typeface="Consolas" charset="0"/>
-                <a:cs typeface="Consolas" charset="0"/>
-              </a:rPr>
-              <a:t>mybucket</a:t>
-            </a:r>
-            <a:r>
-              <a:rPr lang="en-US" sz="1600" b="1" dirty="0" smtClean="0">
+              <a:rPr lang="en-US" sz="1400" b="1" dirty="0">
                 <a:solidFill>
                   <a:schemeClr val="accent3"/>
                 </a:solidFill>
@@ -40326,7 +40499,7 @@
               <a:t> </a:t>
             </a:r>
             <a:r>
-              <a:rPr lang="en-US" sz="1600" b="1" dirty="0">
+              <a:rPr lang="en-US" sz="1400" b="1" dirty="0" err="1">
                 <a:solidFill>
                   <a:schemeClr val="accent3"/>
                 </a:solidFill>
@@ -40334,10 +40507,53 @@
                 <a:ea typeface="Consolas" charset="0"/>
                 <a:cs typeface="Consolas" charset="0"/>
               </a:rPr>
-              <a:t>--profile hp-aw2-1-demo-admin --region hp-aw2-1 </a:t>
-            </a:r>
-            <a:r>
-              <a:rPr lang="en-US" sz="1600" b="1" dirty="0" smtClean="0">
+              <a:t>iam</a:t>
+            </a:r>
+            <a:r>
+              <a:rPr lang="en-US" sz="1400" b="1" dirty="0">
+                <a:solidFill>
+                  <a:schemeClr val="accent3"/>
+                </a:solidFill>
+                <a:latin typeface="Consolas" charset="0"/>
+                <a:ea typeface="Consolas" charset="0"/>
+                <a:cs typeface="Consolas" charset="0"/>
+              </a:rPr>
+              <a:t> </a:t>
+            </a:r>
+            <a:r>
+              <a:rPr lang="en-US" sz="1400" b="1" dirty="0" smtClean="0">
+                <a:solidFill>
+                  <a:schemeClr val="accent3"/>
+                </a:solidFill>
+                <a:latin typeface="Consolas" charset="0"/>
+                <a:ea typeface="Consolas" charset="0"/>
+                <a:cs typeface="Consolas" charset="0"/>
+              </a:rPr>
+              <a:t>list-groups </a:t>
+            </a:r>
+            <a:r>
+              <a:rPr lang="en-US" sz="1400" b="1" dirty="0">
+                <a:solidFill>
+                  <a:schemeClr val="accent3"/>
+                </a:solidFill>
+                <a:latin typeface="Consolas" charset="0"/>
+                <a:ea typeface="Consolas" charset="0"/>
+                <a:cs typeface="Consolas" charset="0"/>
+              </a:rPr>
+              <a:t>--profile hp-aw2-1-demo-admin --region hp-aw2-1</a:t>
+            </a:r>
+            <a:br>
+              <a:rPr lang="en-US" sz="1400" b="1" dirty="0">
+                <a:solidFill>
+                  <a:schemeClr val="accent3"/>
+                </a:solidFill>
+                <a:latin typeface="Consolas" charset="0"/>
+                <a:ea typeface="Consolas" charset="0"/>
+                <a:cs typeface="Consolas" charset="0"/>
+              </a:rPr>
+            </a:br>
+            <a:r>
+              <a:rPr lang="en-US" sz="1400" b="1" dirty="0">
                 <a:solidFill>
                   <a:schemeClr val="accent3"/>
                 </a:solidFill>
@@ -40348,7 +40564,7 @@
               <a:t/>
             </a:r>
             <a:br>
-              <a:rPr lang="en-US" sz="1600" b="1" dirty="0" smtClean="0">
+              <a:rPr lang="en-US" sz="1400" b="1" dirty="0">
                 <a:solidFill>
                   <a:schemeClr val="accent3"/>
                 </a:solidFill>
@@ -40358,32 +40574,15 @@
               </a:rPr>
             </a:br>
             <a:r>
-              <a:rPr lang="en-US" sz="1600" b="1" dirty="0" smtClean="0">
-                <a:solidFill>
-                  <a:schemeClr val="accent3"/>
-                </a:solidFill>
+              <a:rPr lang="en-US" sz="1400" b="1" dirty="0">
                 <a:latin typeface="Consolas" charset="0"/>
                 <a:ea typeface="Consolas" charset="0"/>
                 <a:cs typeface="Consolas" charset="0"/>
               </a:rPr>
-              <a:t/>
-            </a:r>
-            <a:br>
-              <a:rPr lang="en-US" sz="1600" b="1" dirty="0" smtClean="0">
-                <a:solidFill>
-                  <a:schemeClr val="accent3"/>
-                </a:solidFill>
-                <a:latin typeface="Consolas" charset="0"/>
-                <a:ea typeface="Consolas" charset="0"/>
-                <a:cs typeface="Consolas" charset="0"/>
-              </a:rPr>
-            </a:br>
-            <a:r>
-              <a:rPr lang="en-US" sz="1600" dirty="0" smtClean="0"/>
               <a:t># </a:t>
             </a:r>
             <a:r>
-              <a:rPr lang="en-US" sz="1600" b="1" dirty="0" err="1">
+              <a:rPr lang="en-US" sz="1400" b="1" dirty="0" err="1">
                 <a:solidFill>
                   <a:schemeClr val="accent3"/>
                 </a:solidFill>
@@ -40394,7 +40593,7 @@
               <a:t>aws</a:t>
             </a:r>
             <a:r>
-              <a:rPr lang="en-US" sz="1600" b="1" dirty="0">
+              <a:rPr lang="en-US" sz="1400" b="1" dirty="0">
                 <a:solidFill>
                   <a:schemeClr val="accent3"/>
                 </a:solidFill>
@@ -40405,7 +40604,7 @@
               <a:t> </a:t>
             </a:r>
             <a:r>
-              <a:rPr lang="en-US" sz="1600" b="1" dirty="0" err="1" smtClean="0">
+              <a:rPr lang="en-US" sz="1400" b="1" dirty="0" err="1">
                 <a:solidFill>
                   <a:schemeClr val="accent3"/>
                 </a:solidFill>
@@ -40413,10 +40612,10 @@
                 <a:ea typeface="Consolas" charset="0"/>
                 <a:cs typeface="Consolas" charset="0"/>
               </a:rPr>
-              <a:t>iam</a:t>
-            </a:r>
-            <a:r>
-              <a:rPr lang="en-US" sz="1600" b="1" dirty="0" smtClean="0">
+              <a:t>cloudwatch</a:t>
+            </a:r>
+            <a:r>
+              <a:rPr lang="en-US" sz="1400" b="1" dirty="0">
                 <a:solidFill>
                   <a:schemeClr val="accent3"/>
                 </a:solidFill>
@@ -40424,10 +40623,10 @@
                 <a:ea typeface="Consolas" charset="0"/>
                 <a:cs typeface="Consolas" charset="0"/>
               </a:rPr>
-              <a:t> list-users </a:t>
-            </a:r>
-            <a:r>
-              <a:rPr lang="en-US" sz="1600" b="1" dirty="0">
+              <a:t> describe-alarms </a:t>
+            </a:r>
+            <a:r>
+              <a:rPr lang="en-US" sz="1400" b="1" dirty="0" smtClean="0">
                 <a:solidFill>
                   <a:schemeClr val="accent3"/>
                 </a:solidFill>
@@ -40435,10 +40634,10 @@
                 <a:ea typeface="Consolas" charset="0"/>
                 <a:cs typeface="Consolas" charset="0"/>
               </a:rPr>
-              <a:t>--profile hp-aw2-1-demo-admin --region </a:t>
-            </a:r>
-            <a:r>
-              <a:rPr lang="en-US" sz="1600" b="1" dirty="0" smtClean="0">
+              <a:t>--</a:t>
+            </a:r>
+            <a:r>
+              <a:rPr lang="en-US" sz="1400" b="1" dirty="0">
                 <a:solidFill>
                   <a:schemeClr val="accent3"/>
                 </a:solidFill>
@@ -40446,10 +40645,27 @@
                 <a:ea typeface="Consolas" charset="0"/>
                 <a:cs typeface="Consolas" charset="0"/>
               </a:rPr>
-              <a:t>hp-aw2-1</a:t>
+              <a:t>profile hp-aw2-1-demo-admin --region hp-aw2-1</a:t>
+            </a:r>
+          </a:p>
+          <a:p>
+            <a:r>
+              <a:rPr lang="en-US" dirty="0" smtClean="0"/>
+              <a:t>Using Environment Variables</a:t>
             </a:r>
             <a:br>
-              <a:rPr lang="en-US" sz="1600" b="1" dirty="0" smtClean="0">
+              <a:rPr lang="en-US" dirty="0" smtClean="0"/>
+            </a:br>
+            <a:r>
+              <a:rPr lang="en-US" sz="1400" b="1" dirty="0">
+                <a:latin typeface="Consolas" charset="0"/>
+                <a:ea typeface="Consolas" charset="0"/>
+                <a:cs typeface="Consolas" charset="0"/>
+              </a:rPr>
+              <a:t># </a:t>
+            </a:r>
+            <a:r>
+              <a:rPr lang="en-US" sz="1400" b="1" dirty="0">
                 <a:solidFill>
                   <a:schemeClr val="accent3"/>
                 </a:solidFill>
@@ -40457,13 +40673,93 @@
                 <a:ea typeface="Consolas" charset="0"/>
                 <a:cs typeface="Consolas" charset="0"/>
               </a:rPr>
+              <a:t>export </a:t>
+            </a:r>
+            <a:r>
+              <a:rPr lang="en-US" sz="1400" b="1" dirty="0" smtClean="0">
+                <a:solidFill>
+                  <a:schemeClr val="accent3"/>
+                </a:solidFill>
+                <a:latin typeface="Consolas" charset="0"/>
+                <a:ea typeface="Consolas" charset="0"/>
+                <a:cs typeface="Consolas" charset="0"/>
+              </a:rPr>
+              <a:t>AWS_DEFAULT_PROFILE=hp-aw2-1-demo-admin</a:t>
+            </a:r>
+            <a:r>
+              <a:rPr lang="en-US" sz="1400" b="1" dirty="0">
+                <a:latin typeface="Consolas" charset="0"/>
+                <a:ea typeface="Consolas" charset="0"/>
+                <a:cs typeface="Consolas" charset="0"/>
+              </a:rPr>
+              <a:t/>
+            </a:r>
+            <a:br>
+              <a:rPr lang="en-US" sz="1400" b="1" dirty="0">
+                <a:latin typeface="Consolas" charset="0"/>
+                <a:ea typeface="Consolas" charset="0"/>
+                <a:cs typeface="Consolas" charset="0"/>
+              </a:rPr>
             </a:br>
             <a:r>
-              <a:rPr lang="en-US" sz="1600" dirty="0" smtClean="0"/>
+              <a:rPr lang="en-US" sz="1400" b="1" dirty="0" smtClean="0">
+                <a:latin typeface="Consolas" charset="0"/>
+                <a:ea typeface="Consolas" charset="0"/>
+                <a:cs typeface="Consolas" charset="0"/>
+              </a:rPr>
               <a:t># </a:t>
             </a:r>
             <a:r>
-              <a:rPr lang="en-US" sz="1600" b="1" dirty="0" err="1">
+              <a:rPr lang="en-US" sz="1400" b="1" dirty="0" smtClean="0">
+                <a:solidFill>
+                  <a:schemeClr val="accent3"/>
+                </a:solidFill>
+                <a:latin typeface="Consolas" charset="0"/>
+                <a:ea typeface="Consolas" charset="0"/>
+                <a:cs typeface="Consolas" charset="0"/>
+              </a:rPr>
+              <a:t>export AWS_DEFAULT_REGION=hp-aw2-1</a:t>
+            </a:r>
+            <a:r>
+              <a:rPr lang="en-US" sz="1400" b="1" dirty="0" smtClean="0">
+                <a:latin typeface="Consolas" charset="0"/>
+                <a:ea typeface="Consolas" charset="0"/>
+                <a:cs typeface="Consolas" charset="0"/>
+              </a:rPr>
+              <a:t/>
+            </a:r>
+            <a:br>
+              <a:rPr lang="en-US" sz="1400" b="1" dirty="0" smtClean="0">
+                <a:latin typeface="Consolas" charset="0"/>
+                <a:ea typeface="Consolas" charset="0"/>
+                <a:cs typeface="Consolas" charset="0"/>
+              </a:rPr>
+            </a:br>
+            <a:r>
+              <a:rPr lang="en-US" sz="1400" b="1" dirty="0" smtClean="0">
+                <a:latin typeface="Consolas" charset="0"/>
+                <a:ea typeface="Consolas" charset="0"/>
+                <a:cs typeface="Consolas" charset="0"/>
+              </a:rPr>
+              <a:t/>
+            </a:r>
+            <a:br>
+              <a:rPr lang="en-US" sz="1400" b="1" dirty="0" smtClean="0">
+                <a:latin typeface="Consolas" charset="0"/>
+                <a:ea typeface="Consolas" charset="0"/>
+                <a:cs typeface="Consolas" charset="0"/>
+              </a:rPr>
+            </a:br>
+            <a:r>
+              <a:rPr lang="en-US" sz="1400" b="1" dirty="0" smtClean="0">
+                <a:latin typeface="Consolas" charset="0"/>
+                <a:ea typeface="Consolas" charset="0"/>
+                <a:cs typeface="Consolas" charset="0"/>
+              </a:rPr>
+              <a:t># </a:t>
+            </a:r>
+            <a:r>
+              <a:rPr lang="en-US" sz="1400" b="1" dirty="0" err="1" smtClean="0">
                 <a:solidFill>
                   <a:schemeClr val="accent3"/>
                 </a:solidFill>
@@ -40474,7 +40770,7 @@
               <a:t>aws</a:t>
             </a:r>
             <a:r>
-              <a:rPr lang="en-US" sz="1600" b="1" dirty="0">
+              <a:rPr lang="en-US" sz="1400" b="1" dirty="0" smtClean="0">
                 <a:solidFill>
                   <a:schemeClr val="accent3"/>
                 </a:solidFill>
@@ -40482,85 +40778,25 @@
                 <a:ea typeface="Consolas" charset="0"/>
                 <a:cs typeface="Consolas" charset="0"/>
               </a:rPr>
-              <a:t> </a:t>
-            </a:r>
-            <a:r>
-              <a:rPr lang="en-US" sz="1600" b="1" dirty="0" err="1">
-                <a:solidFill>
-                  <a:schemeClr val="accent3"/>
-                </a:solidFill>
+              <a:t> ec2 describe-key-pairs</a:t>
+            </a:r>
+            <a:r>
+              <a:rPr lang="en-US" sz="1400" b="1" dirty="0" smtClean="0">
                 <a:latin typeface="Consolas" charset="0"/>
                 <a:ea typeface="Consolas" charset="0"/>
                 <a:cs typeface="Consolas" charset="0"/>
               </a:rPr>
-              <a:t>iam</a:t>
-            </a:r>
-            <a:r>
-              <a:rPr lang="en-US" sz="1600" b="1" dirty="0">
-                <a:solidFill>
-                  <a:schemeClr val="accent3"/>
-                </a:solidFill>
-                <a:latin typeface="Consolas" charset="0"/>
-                <a:ea typeface="Consolas" charset="0"/>
-                <a:cs typeface="Consolas" charset="0"/>
-              </a:rPr>
-              <a:t> </a:t>
-            </a:r>
-            <a:r>
-              <a:rPr lang="en-US" sz="1600" b="1" dirty="0" smtClean="0">
-                <a:solidFill>
-                  <a:schemeClr val="accent3"/>
-                </a:solidFill>
-                <a:latin typeface="Consolas" charset="0"/>
-                <a:ea typeface="Consolas" charset="0"/>
-                <a:cs typeface="Consolas" charset="0"/>
-              </a:rPr>
-              <a:t>list-groups </a:t>
-            </a:r>
-            <a:r>
-              <a:rPr lang="en-US" sz="1600" b="1" dirty="0">
-                <a:solidFill>
-                  <a:schemeClr val="accent3"/>
-                </a:solidFill>
-                <a:latin typeface="Consolas" charset="0"/>
-                <a:ea typeface="Consolas" charset="0"/>
-                <a:cs typeface="Consolas" charset="0"/>
-              </a:rPr>
-              <a:t>--profile hp-aw2-1-demo-admin --region hp-aw2-1</a:t>
+              <a:t/>
             </a:r>
             <a:br>
-              <a:rPr lang="en-US" sz="1600" b="1" dirty="0">
-                <a:solidFill>
-                  <a:schemeClr val="accent3"/>
-                </a:solidFill>
+              <a:rPr lang="en-US" sz="1400" b="1" dirty="0" smtClean="0">
                 <a:latin typeface="Consolas" charset="0"/>
                 <a:ea typeface="Consolas" charset="0"/>
                 <a:cs typeface="Consolas" charset="0"/>
               </a:rPr>
             </a:br>
             <a:r>
-              <a:rPr lang="en-US" sz="1600" b="1" dirty="0">
-                <a:solidFill>
-                  <a:schemeClr val="accent3"/>
-                </a:solidFill>
-                <a:latin typeface="Consolas" charset="0"/>
-                <a:ea typeface="Consolas" charset="0"/>
-                <a:cs typeface="Consolas" charset="0"/>
-              </a:rPr>
-              <a:t/>
-            </a:r>
-            <a:br>
-              <a:rPr lang="en-US" sz="1600" b="1" dirty="0">
-                <a:solidFill>
-                  <a:schemeClr val="accent3"/>
-                </a:solidFill>
-                <a:latin typeface="Consolas" charset="0"/>
-                <a:ea typeface="Consolas" charset="0"/>
-                <a:cs typeface="Consolas" charset="0"/>
-              </a:rPr>
-            </a:br>
-            <a:r>
-              <a:rPr lang="en-US" sz="1600" b="1" dirty="0">
+              <a:rPr lang="en-US" sz="1400" b="1" dirty="0" smtClean="0">
                 <a:latin typeface="Consolas" charset="0"/>
                 <a:ea typeface="Consolas" charset="0"/>
                 <a:cs typeface="Consolas" charset="0"/>
@@ -40568,7 +40804,7 @@
               <a:t># </a:t>
             </a:r>
             <a:r>
-              <a:rPr lang="en-US" sz="1600" b="1" dirty="0" err="1">
+              <a:rPr lang="en-US" sz="1400" b="1" dirty="0" err="1" smtClean="0">
                 <a:solidFill>
                   <a:schemeClr val="accent3"/>
                 </a:solidFill>
@@ -40579,181 +40815,7 @@
               <a:t>aws</a:t>
             </a:r>
             <a:r>
-              <a:rPr lang="en-US" sz="1600" b="1" dirty="0">
-                <a:solidFill>
-                  <a:schemeClr val="accent3"/>
-                </a:solidFill>
-                <a:latin typeface="Consolas" charset="0"/>
-                <a:ea typeface="Consolas" charset="0"/>
-                <a:cs typeface="Consolas" charset="0"/>
-              </a:rPr>
-              <a:t> </a:t>
-            </a:r>
-            <a:r>
-              <a:rPr lang="en-US" sz="1600" b="1" dirty="0" err="1">
-                <a:solidFill>
-                  <a:schemeClr val="accent3"/>
-                </a:solidFill>
-                <a:latin typeface="Consolas" charset="0"/>
-                <a:ea typeface="Consolas" charset="0"/>
-                <a:cs typeface="Consolas" charset="0"/>
-              </a:rPr>
-              <a:t>cloudwatch</a:t>
-            </a:r>
-            <a:r>
-              <a:rPr lang="en-US" sz="1600" b="1" dirty="0">
-                <a:solidFill>
-                  <a:schemeClr val="accent3"/>
-                </a:solidFill>
-                <a:latin typeface="Consolas" charset="0"/>
-                <a:ea typeface="Consolas" charset="0"/>
-                <a:cs typeface="Consolas" charset="0"/>
-              </a:rPr>
-              <a:t> describe-alarms </a:t>
-            </a:r>
-            <a:r>
-              <a:rPr lang="en-US" sz="1600" b="1" dirty="0" smtClean="0">
-                <a:solidFill>
-                  <a:schemeClr val="accent3"/>
-                </a:solidFill>
-                <a:latin typeface="Consolas" charset="0"/>
-                <a:ea typeface="Consolas" charset="0"/>
-                <a:cs typeface="Consolas" charset="0"/>
-              </a:rPr>
-              <a:t>--</a:t>
-            </a:r>
-            <a:r>
-              <a:rPr lang="en-US" sz="1600" b="1" dirty="0">
-                <a:solidFill>
-                  <a:schemeClr val="accent3"/>
-                </a:solidFill>
-                <a:latin typeface="Consolas" charset="0"/>
-                <a:ea typeface="Consolas" charset="0"/>
-                <a:cs typeface="Consolas" charset="0"/>
-              </a:rPr>
-              <a:t>profile hp-aw2-1-demo-admin --region hp-aw2-1</a:t>
-            </a:r>
-          </a:p>
-          <a:p>
-            <a:r>
-              <a:rPr lang="en-US" dirty="0" smtClean="0"/>
-              <a:t>Using Environment Variables</a:t>
-            </a:r>
-            <a:br>
-              <a:rPr lang="en-US" dirty="0" smtClean="0"/>
-            </a:br>
-            <a:r>
-              <a:rPr lang="en-US" sz="1600" dirty="0"/>
-              <a:t># </a:t>
-            </a:r>
-            <a:r>
-              <a:rPr lang="en-US" sz="1600" b="1" dirty="0">
-                <a:solidFill>
-                  <a:schemeClr val="accent3"/>
-                </a:solidFill>
-                <a:latin typeface="Consolas" charset="0"/>
-                <a:ea typeface="Consolas" charset="0"/>
-                <a:cs typeface="Consolas" charset="0"/>
-              </a:rPr>
-              <a:t>export </a:t>
-            </a:r>
-            <a:r>
-              <a:rPr lang="en-US" sz="1600" b="1" dirty="0" smtClean="0">
-                <a:solidFill>
-                  <a:schemeClr val="accent3"/>
-                </a:solidFill>
-                <a:latin typeface="Consolas" charset="0"/>
-                <a:ea typeface="Consolas" charset="0"/>
-                <a:cs typeface="Consolas" charset="0"/>
-              </a:rPr>
-              <a:t>AWS_DEFAULT_PROFILE=hp-aw2-1-demo-admin</a:t>
-            </a:r>
-            <a:r>
-              <a:rPr lang="en-US" sz="1600" dirty="0"/>
-              <a:t/>
-            </a:r>
-            <a:br>
-              <a:rPr lang="en-US" sz="1600" dirty="0"/>
-            </a:br>
-            <a:r>
-              <a:rPr lang="en-US" sz="1600" dirty="0" smtClean="0"/>
-              <a:t># </a:t>
-            </a:r>
-            <a:r>
-              <a:rPr lang="en-US" sz="1600" b="1" dirty="0" smtClean="0">
-                <a:solidFill>
-                  <a:schemeClr val="accent3"/>
-                </a:solidFill>
-                <a:latin typeface="Consolas" charset="0"/>
-                <a:ea typeface="Consolas" charset="0"/>
-                <a:cs typeface="Consolas" charset="0"/>
-              </a:rPr>
-              <a:t>export AWS_DEFAULT_REGION=hp-aw2-1</a:t>
-            </a:r>
-            <a:r>
-              <a:rPr lang="en-US" sz="1600" dirty="0" smtClean="0"/>
-              <a:t/>
-            </a:r>
-            <a:br>
-              <a:rPr lang="en-US" sz="1600" dirty="0" smtClean="0"/>
-            </a:br>
-            <a:r>
-              <a:rPr lang="en-US" sz="1600" dirty="0" smtClean="0"/>
-              <a:t/>
-            </a:r>
-            <a:br>
-              <a:rPr lang="en-US" sz="1600" dirty="0" smtClean="0"/>
-            </a:br>
-            <a:r>
-              <a:rPr lang="en-US" sz="1600" dirty="0" smtClean="0"/>
-              <a:t># </a:t>
-            </a:r>
-            <a:r>
-              <a:rPr lang="en-US" sz="1600" b="1" dirty="0" err="1" smtClean="0">
-                <a:solidFill>
-                  <a:schemeClr val="accent3"/>
-                </a:solidFill>
-                <a:latin typeface="Consolas" charset="0"/>
-                <a:ea typeface="Consolas" charset="0"/>
-                <a:cs typeface="Consolas" charset="0"/>
-              </a:rPr>
-              <a:t>aws</a:t>
-            </a:r>
-            <a:r>
-              <a:rPr lang="en-US" sz="1600" b="1" dirty="0" smtClean="0">
-                <a:solidFill>
-                  <a:schemeClr val="accent3"/>
-                </a:solidFill>
-                <a:latin typeface="Consolas" charset="0"/>
-                <a:ea typeface="Consolas" charset="0"/>
-                <a:cs typeface="Consolas" charset="0"/>
-              </a:rPr>
-              <a:t> ec2 describe-key-pairs</a:t>
-            </a:r>
-            <a:r>
-              <a:rPr lang="en-US" sz="1600" dirty="0" smtClean="0"/>
-              <a:t/>
-            </a:r>
-            <a:br>
-              <a:rPr lang="en-US" sz="1600" dirty="0" smtClean="0"/>
-            </a:br>
-            <a:r>
-              <a:rPr lang="en-US" sz="1600" dirty="0" smtClean="0"/>
-              <a:t># </a:t>
-            </a:r>
-            <a:r>
-              <a:rPr lang="en-US" sz="1600" b="1" dirty="0" err="1" smtClean="0">
-                <a:solidFill>
-                  <a:schemeClr val="accent3"/>
-                </a:solidFill>
-                <a:latin typeface="Consolas" charset="0"/>
-                <a:ea typeface="Consolas" charset="0"/>
-                <a:cs typeface="Consolas" charset="0"/>
-              </a:rPr>
-              <a:t>aws</a:t>
-            </a:r>
-            <a:r>
-              <a:rPr lang="en-US" sz="1600" b="1" dirty="0" smtClean="0">
+              <a:rPr lang="en-US" sz="1400" b="1" dirty="0" smtClean="0">
                 <a:solidFill>
                   <a:schemeClr val="accent3"/>
                 </a:solidFill>
@@ -40956,14 +41018,6 @@
             </a:endParaRPr>
           </a:p>
           <a:p>
-            <a:pPr lvl="2"/>
-            <a:r>
-              <a:rPr lang="en-US" dirty="0" smtClean="0"/>
-              <a:t>4.2 related content currently under “feature/4.2” branch, will move to master once stable.</a:t>
-            </a:r>
-            <a:endParaRPr lang="en-US" dirty="0"/>
-          </a:p>
-          <a:p>
             <a:pPr lvl="1"/>
             <a:r>
               <a:rPr lang="en-US" dirty="0" smtClean="0"/>
@@ -40974,7 +41028,6 @@
                 <a:solidFill>
                   <a:srgbClr val="00B388"/>
                 </a:solidFill>
-                <a:hlinkClick r:id="rId2"/>
               </a:rPr>
               <a:t>https://</a:t>
             </a:r>
@@ -40983,9 +41036,131 @@
                 <a:solidFill>
                   <a:srgbClr val="00B388"/>
                 </a:solidFill>
-                <a:hlinkClick r:id="rId2"/>
               </a:rPr>
-              <a:t>github.com/eucalyptus/euca-demo/tree/feature/4.2/demos/demo-90-configure-management-workstation/demo-90-configure-management-workstation-short.pptx</a:t>
+              <a:t>github.com/eucalyptus/euca-demo/blob/master/demos/demo-90-configure-management-workstation/demo-90-configure-management-workstation-short.pptx</a:t>
+            </a:r>
+          </a:p>
+          <a:p>
+            <a:pPr lvl="1"/>
+            <a:r>
+              <a:rPr lang="en-US" dirty="0" smtClean="0"/>
+              <a:t>Color-Coded _</a:t>
+            </a:r>
+            <a:r>
+              <a:rPr lang="en-US" dirty="0" err="1" smtClean="0"/>
+              <a:t>endpoints.json</a:t>
+            </a:r>
+            <a:r>
+              <a:rPr lang="en-US" dirty="0"/>
+              <a:t> Example: </a:t>
+            </a:r>
+            <a:r>
+              <a:rPr lang="en-US" dirty="0">
+                <a:solidFill>
+                  <a:srgbClr val="00B388"/>
+                </a:solidFill>
+              </a:rPr>
+              <a:t>https://</a:t>
+            </a:r>
+            <a:r>
+              <a:rPr lang="en-US" dirty="0" smtClean="0">
+                <a:solidFill>
+                  <a:srgbClr val="00B388"/>
+                </a:solidFill>
+              </a:rPr>
+              <a:t>github.com/eucalyptus/euca-demo/blob/master/demos/demo-90-configure-management-workstation/docs/demo-90-configure-management-workstation-endpoints-local-ssl.docx</a:t>
+            </a:r>
+          </a:p>
+          <a:p>
+            <a:pPr lvl="1"/>
+            <a:r>
+              <a:rPr lang="en-US" dirty="0" smtClean="0"/>
+              <a:t>Configure AWSCLI Detailed Procedure: </a:t>
+            </a:r>
+            <a:r>
+              <a:rPr lang="en-US" dirty="0" smtClean="0">
+                <a:solidFill>
+                  <a:srgbClr val="00B388"/>
+                </a:solidFill>
+                <a:ea typeface="Consolas" charset="0"/>
+                <a:cs typeface="Consolas" charset="0"/>
+              </a:rPr>
+              <a:t>https://github.com/eucalyptus/euca-demo/blob/master/installs/install-10-faststart/docs/install-16-faststart-configure-awscli.md</a:t>
+            </a:r>
+          </a:p>
+          <a:p>
+            <a:pPr lvl="1"/>
+            <a:r>
+              <a:rPr lang="en-US" dirty="0"/>
+              <a:t>Configure </a:t>
+            </a:r>
+            <a:r>
+              <a:rPr lang="en-US" dirty="0" smtClean="0"/>
+              <a:t>Management Workstation </a:t>
+            </a:r>
+            <a:r>
+              <a:rPr lang="en-US" dirty="0"/>
+              <a:t>Detailed Procedure: </a:t>
+            </a:r>
+            <a:r>
+              <a:rPr lang="en-US" dirty="0" smtClean="0">
+                <a:solidFill>
+                  <a:srgbClr val="00B388"/>
+                </a:solidFill>
+                <a:ea typeface="Consolas" charset="0"/>
+                <a:cs typeface="Consolas" charset="0"/>
+              </a:rPr>
+              <a:t>https</a:t>
+            </a:r>
+            <a:r>
+              <a:rPr lang="en-US" dirty="0">
+                <a:solidFill>
+                  <a:srgbClr val="00B388"/>
+                </a:solidFill>
+                <a:ea typeface="Consolas" charset="0"/>
+                <a:cs typeface="Consolas" charset="0"/>
+              </a:rPr>
+              <a:t>://</a:t>
+            </a:r>
+            <a:r>
+              <a:rPr lang="en-US" dirty="0" err="1">
+                <a:solidFill>
+                  <a:srgbClr val="00B388"/>
+                </a:solidFill>
+                <a:ea typeface="Consolas" charset="0"/>
+                <a:cs typeface="Consolas" charset="0"/>
+              </a:rPr>
+              <a:t>github.com</a:t>
+            </a:r>
+            <a:r>
+              <a:rPr lang="en-US" dirty="0">
+                <a:solidFill>
+                  <a:srgbClr val="00B388"/>
+                </a:solidFill>
+                <a:ea typeface="Consolas" charset="0"/>
+                <a:cs typeface="Consolas" charset="0"/>
+              </a:rPr>
+              <a:t>/eucalyptus/</a:t>
+            </a:r>
+            <a:r>
+              <a:rPr lang="en-US" dirty="0" err="1">
+                <a:solidFill>
+                  <a:srgbClr val="00B388"/>
+                </a:solidFill>
+                <a:ea typeface="Consolas" charset="0"/>
+                <a:cs typeface="Consolas" charset="0"/>
+              </a:rPr>
+              <a:t>euca</a:t>
+            </a:r>
+            <a:r>
+              <a:rPr lang="en-US" dirty="0">
+                <a:solidFill>
+                  <a:srgbClr val="00B388"/>
+                </a:solidFill>
+                <a:ea typeface="Consolas" charset="0"/>
+                <a:cs typeface="Consolas" charset="0"/>
+              </a:rPr>
+              <a:t>-demo/blob/master/demos/demo-90-configure-management-workstation/docs/demo-90-configure-management-workstation.md</a:t>
             </a:r>
             <a:endParaRPr lang="en-US" dirty="0" smtClean="0">
               <a:solidFill>
@@ -40994,72 +41169,29 @@
             </a:endParaRPr>
           </a:p>
           <a:p>
-            <a:pPr lvl="1"/>
-            <a:r>
-              <a:rPr lang="en-US" dirty="0" smtClean="0"/>
-              <a:t>Color-Coded _</a:t>
-            </a:r>
-            <a:r>
-              <a:rPr lang="en-US" dirty="0" err="1" smtClean="0"/>
-              <a:t>endpoints.json</a:t>
-            </a:r>
-            <a:r>
-              <a:rPr lang="en-US" dirty="0"/>
-              <a:t> Example: </a:t>
-            </a:r>
-            <a:r>
-              <a:rPr lang="en-US" dirty="0">
-                <a:hlinkClick r:id="rId3"/>
-              </a:rPr>
-              <a:t>https://</a:t>
-            </a:r>
-            <a:r>
-              <a:rPr lang="en-US" dirty="0" smtClean="0">
-                <a:hlinkClick r:id="rId3"/>
-              </a:rPr>
-              <a:t>github.com/eucalyptus/euca-demo/blob/feature/4.2/demos/demo-90-configure-management-workstation/docs/demo-90-configure-management-workstation-endpoints-local-ssl.pptx</a:t>
-            </a:r>
-            <a:endParaRPr lang="en-US" dirty="0" smtClean="0"/>
+            <a:r>
+              <a:rPr lang="en-US" sz="2000" b="1" dirty="0" smtClean="0"/>
+              <a:t>AWSCLI</a:t>
+            </a:r>
+            <a:endParaRPr lang="en-US" b="1" dirty="0" smtClean="0"/>
           </a:p>
           <a:p>
             <a:pPr lvl="1"/>
             <a:r>
-              <a:rPr lang="en-US" dirty="0" smtClean="0"/>
-              <a:t>Configure AWSCLI Detailed Procedure: </a:t>
-            </a:r>
-            <a:r>
-              <a:rPr lang="en-US" dirty="0" smtClean="0">
+              <a:rPr lang="en-US" b="1" dirty="0" smtClean="0">
                 <a:solidFill>
-                  <a:srgbClr val="00B388"/>
+                  <a:schemeClr val="accent3"/>
                 </a:solidFill>
-                <a:ea typeface="Consolas" charset="0"/>
-                <a:cs typeface="Consolas" charset="0"/>
-                <a:hlinkClick r:id="rId4"/>
               </a:rPr>
-              <a:t>https://github.com/eucalyptus/euca-demo/blob/master/installs/install-10-faststart/docs/install-16-faststart-configure-awscli.md</a:t>
-            </a:r>
-            <a:endParaRPr lang="en-US" dirty="0" smtClean="0">
-              <a:solidFill>
-                <a:srgbClr val="00B388"/>
-              </a:solidFill>
-            </a:endParaRPr>
-          </a:p>
-          <a:p>
-            <a:r>
-              <a:rPr lang="en-US" sz="2000" b="1" dirty="0" smtClean="0"/>
-              <a:t>AWSCLI</a:t>
-            </a:r>
-            <a:endParaRPr lang="en-US" b="1" dirty="0"/>
-          </a:p>
-          <a:p>
-            <a:pPr lvl="1"/>
+              <a:t>Google</a:t>
+            </a:r>
             <a:r>
               <a:rPr lang="en-US" b="1" dirty="0">
                 <a:solidFill>
                   <a:schemeClr val="accent3"/>
                 </a:solidFill>
               </a:rPr>
-              <a:t>Google: “</a:t>
+              <a:t>: “</a:t>
             </a:r>
             <a:r>
               <a:rPr lang="en-US" b="1" dirty="0" err="1">
@@ -41102,18 +41234,8 @@
                 <a:solidFill>
                   <a:srgbClr val="00B388"/>
                 </a:solidFill>
-                <a:hlinkClick r:id="rId5"/>
               </a:rPr>
               <a:t>http://</a:t>
-            </a:r>
-            <a:r>
-              <a:rPr lang="en-US" dirty="0" smtClean="0">
-                <a:solidFill>
-                  <a:srgbClr val="00B388"/>
-                </a:solidFill>
-                <a:hlinkClick r:id="rId5"/>
-              </a:rPr>
-              <a:t>docs.aws.amazon.com/cli/latest/userguide/installing.html#install-with-pip</a:t>
             </a:r>
             <a:r>
               <a:rPr lang="en-US" dirty="0" smtClean="0">
@@ -41121,7 +41243,7 @@
                   <a:srgbClr val="00B388"/>
                 </a:solidFill>
               </a:rPr>
-              <a:t> </a:t>
+              <a:t>docs.aws.amazon.com/cli/latest/userguide/installing.html#install-with-pip </a:t>
             </a:r>
             <a:endParaRPr lang="en-US" dirty="0">
               <a:solidFill>
@@ -42534,7 +42656,7 @@
           <a:p>
             <a:pPr lvl="1"/>
             <a:r>
-              <a:rPr lang="en-US" b="1" dirty="0">
+              <a:rPr lang="en-US" sz="1400" b="1" dirty="0">
                 <a:solidFill>
                   <a:schemeClr val="accent3"/>
                 </a:solidFill>
@@ -42545,7 +42667,7 @@
               <a:t>/usr/lib/python2.6/site-packages/</a:t>
             </a:r>
             <a:r>
-              <a:rPr lang="en-US" b="1" dirty="0" err="1">
+              <a:rPr lang="en-US" sz="1400" b="1" dirty="0" err="1">
                 <a:solidFill>
                   <a:schemeClr val="accent3"/>
                 </a:solidFill>
@@ -42556,7 +42678,7 @@
               <a:t>botocore</a:t>
             </a:r>
             <a:r>
-              <a:rPr lang="en-US" b="1" dirty="0">
+              <a:rPr lang="en-US" sz="1400" b="1" dirty="0">
                 <a:solidFill>
                   <a:schemeClr val="accent3"/>
                 </a:solidFill>
@@ -42567,7 +42689,7 @@
               <a:t>/data/_</a:t>
             </a:r>
             <a:r>
-              <a:rPr lang="en-US" b="1" dirty="0" err="1" smtClean="0">
+              <a:rPr lang="en-US" sz="1400" b="1" dirty="0" err="1" smtClean="0">
                 <a:solidFill>
                   <a:schemeClr val="accent3"/>
                 </a:solidFill>
@@ -42578,7 +42700,7 @@
               <a:t>endpoints.json</a:t>
             </a:r>
             <a:r>
-              <a:rPr lang="en-US" b="1" dirty="0" smtClean="0">
+              <a:rPr lang="en-US" sz="1400" b="1" dirty="0" smtClean="0">
                 <a:solidFill>
                   <a:schemeClr val="accent3"/>
                 </a:solidFill>
@@ -42589,7 +42711,7 @@
               <a:t> (</a:t>
             </a:r>
             <a:r>
-              <a:rPr lang="en-US" b="1" dirty="0" err="1" smtClean="0">
+              <a:rPr lang="en-US" sz="1400" b="1" dirty="0" err="1" smtClean="0">
                 <a:solidFill>
                   <a:schemeClr val="accent3"/>
                 </a:solidFill>
@@ -42600,7 +42722,7 @@
               <a:t>CentOS</a:t>
             </a:r>
             <a:r>
-              <a:rPr lang="en-US" b="1" dirty="0" smtClean="0">
+              <a:rPr lang="en-US" sz="1400" b="1" dirty="0" smtClean="0">
                 <a:solidFill>
                   <a:schemeClr val="accent3"/>
                 </a:solidFill>
@@ -42611,7 +42733,7 @@
               <a:t>)</a:t>
             </a:r>
             <a:br>
-              <a:rPr lang="en-US" b="1" dirty="0" smtClean="0">
+              <a:rPr lang="en-US" sz="1400" b="1" dirty="0" smtClean="0">
                 <a:solidFill>
                   <a:schemeClr val="accent3"/>
                 </a:solidFill>
@@ -42621,7 +42743,7 @@
               </a:rPr>
             </a:br>
             <a:r>
-              <a:rPr lang="en-US" b="1" dirty="0" smtClean="0">
+              <a:rPr lang="en-US" sz="1400" b="1" dirty="0" smtClean="0">
                 <a:solidFill>
                   <a:schemeClr val="accent3"/>
                 </a:solidFill>
@@ -42632,7 +42754,7 @@
               <a:t>/Library/Python/2.7/site-packages/</a:t>
             </a:r>
             <a:r>
-              <a:rPr lang="en-US" b="1" dirty="0" err="1" smtClean="0">
+              <a:rPr lang="en-US" sz="1400" b="1" dirty="0" err="1" smtClean="0">
                 <a:solidFill>
                   <a:schemeClr val="accent3"/>
                 </a:solidFill>
@@ -42643,7 +42765,7 @@
               <a:t>botocore</a:t>
             </a:r>
             <a:r>
-              <a:rPr lang="en-US" b="1" dirty="0" smtClean="0">
+              <a:rPr lang="en-US" sz="1400" b="1" dirty="0" smtClean="0">
                 <a:solidFill>
                   <a:schemeClr val="accent3"/>
                 </a:solidFill>
@@ -42654,7 +42776,7 @@
               <a:t>/data</a:t>
             </a:r>
             <a:r>
-              <a:rPr lang="en-US" b="1" dirty="0">
+              <a:rPr lang="en-US" sz="1400" b="1" dirty="0">
                 <a:solidFill>
                   <a:schemeClr val="accent3"/>
                 </a:solidFill>
@@ -42665,7 +42787,7 @@
               <a:t>/_</a:t>
             </a:r>
             <a:r>
-              <a:rPr lang="en-US" b="1" dirty="0" err="1" smtClean="0">
+              <a:rPr lang="en-US" sz="1400" b="1" dirty="0" err="1" smtClean="0">
                 <a:solidFill>
                   <a:schemeClr val="accent3"/>
                 </a:solidFill>
@@ -42676,7 +42798,7 @@
               <a:t>endpoints.json</a:t>
             </a:r>
             <a:r>
-              <a:rPr lang="en-US" b="1" dirty="0" smtClean="0">
+              <a:rPr lang="en-US" sz="1400" b="1" dirty="0" smtClean="0">
                 <a:solidFill>
                   <a:schemeClr val="accent3"/>
                 </a:solidFill>
@@ -42687,7 +42809,7 @@
               <a:t> (Mac OS X</a:t>
             </a:r>
             <a:r>
-              <a:rPr lang="en-US" b="1" dirty="0">
+              <a:rPr lang="en-US" sz="1400" b="1" dirty="0">
                 <a:solidFill>
                   <a:schemeClr val="accent3"/>
                 </a:solidFill>
@@ -42698,7 +42820,7 @@
               <a:t>)</a:t>
             </a:r>
             <a:br>
-              <a:rPr lang="en-US" b="1" dirty="0">
+              <a:rPr lang="en-US" sz="1400" b="1" dirty="0">
                 <a:solidFill>
                   <a:schemeClr val="accent3"/>
                 </a:solidFill>
@@ -42708,7 +42830,7 @@
               </a:rPr>
             </a:br>
             <a:r>
-              <a:rPr lang="en-US" b="1" dirty="0">
+              <a:rPr lang="en-US" sz="1400" b="1" dirty="0">
                 <a:solidFill>
                   <a:schemeClr val="accent3"/>
                 </a:solidFill>
@@ -42719,7 +42841,7 @@
               <a:t>C:\Program </a:t>
             </a:r>
             <a:r>
-              <a:rPr lang="en-US" b="1" dirty="0" smtClean="0">
+              <a:rPr lang="en-US" sz="1400" b="1" dirty="0" smtClean="0">
                 <a:solidFill>
                   <a:schemeClr val="accent3"/>
                 </a:solidFill>
@@ -42730,7 +42852,7 @@
               <a:t>Files\Amazon\AWSCLI\</a:t>
             </a:r>
             <a:r>
-              <a:rPr lang="en-US" b="1" dirty="0" err="1" smtClean="0">
+              <a:rPr lang="en-US" sz="1400" b="1" dirty="0" err="1" smtClean="0">
                 <a:solidFill>
                   <a:schemeClr val="accent3"/>
                 </a:solidFill>
@@ -42741,7 +42863,7 @@
               <a:t>botocore</a:t>
             </a:r>
             <a:r>
-              <a:rPr lang="en-US" b="1" dirty="0" smtClean="0">
+              <a:rPr lang="en-US" sz="1400" b="1" dirty="0" smtClean="0">
                 <a:solidFill>
                   <a:schemeClr val="accent3"/>
                 </a:solidFill>
@@ -42752,7 +42874,7 @@
               <a:t>\data\</a:t>
             </a:r>
             <a:r>
-              <a:rPr lang="en-US" b="1" dirty="0" err="1" smtClean="0">
+              <a:rPr lang="en-US" sz="1400" b="1" dirty="0" err="1" smtClean="0">
                 <a:solidFill>
                   <a:schemeClr val="accent3"/>
                 </a:solidFill>
@@ -42763,7 +42885,7 @@
               <a:t>aws</a:t>
             </a:r>
             <a:r>
-              <a:rPr lang="en-US" b="1" dirty="0">
+              <a:rPr lang="en-US" sz="1400" b="1" dirty="0">
                 <a:solidFill>
                   <a:schemeClr val="accent3"/>
                 </a:solidFill>
@@ -42774,7 +42896,7 @@
               <a:t>\_</a:t>
             </a:r>
             <a:r>
-              <a:rPr lang="en-US" b="1" dirty="0" err="1" smtClean="0">
+              <a:rPr lang="en-US" sz="1400" b="1" dirty="0" err="1" smtClean="0">
                 <a:solidFill>
                   <a:schemeClr val="accent3"/>
                 </a:solidFill>
@@ -42785,7 +42907,7 @@
               <a:t>endpoints.json</a:t>
             </a:r>
             <a:r>
-              <a:rPr lang="en-US" b="1" dirty="0" smtClean="0">
+              <a:rPr lang="en-US" sz="1400" b="1" dirty="0" smtClean="0">
                 <a:solidFill>
                   <a:schemeClr val="accent3"/>
                 </a:solidFill>
@@ -42795,7 +42917,7 @@
               </a:rPr>
               <a:t> (Windows)</a:t>
             </a:r>
-            <a:endParaRPr lang="en-US" b="1" dirty="0">
+            <a:endParaRPr lang="en-US" sz="1400" b="1" dirty="0">
               <a:solidFill>
                 <a:schemeClr val="accent3"/>
               </a:solidFill>
@@ -42815,7 +42937,7 @@
           <a:p>
             <a:pPr lvl="1"/>
             <a:r>
-              <a:rPr lang="en-US" b="1" dirty="0">
+              <a:rPr lang="en-US" sz="1400" b="1" dirty="0">
                 <a:solidFill>
                   <a:schemeClr val="accent3"/>
                 </a:solidFill>
@@ -42826,7 +42948,7 @@
               <a:t>/</a:t>
             </a:r>
             <a:r>
-              <a:rPr lang="en-US" b="1" dirty="0" smtClean="0">
+              <a:rPr lang="en-US" sz="1400" b="1" dirty="0" smtClean="0">
                 <a:solidFill>
                   <a:schemeClr val="accent3"/>
                 </a:solidFill>
@@ -42837,7 +42959,7 @@
               <a:t>usr/lib/python2.6/site-packages/</a:t>
             </a:r>
             <a:r>
-              <a:rPr lang="en-US" b="1" dirty="0" err="1" smtClean="0">
+              <a:rPr lang="en-US" sz="1400" b="1" dirty="0" err="1" smtClean="0">
                 <a:solidFill>
                   <a:schemeClr val="accent3"/>
                 </a:solidFill>
@@ -42848,7 +42970,7 @@
               <a:t>botocore</a:t>
             </a:r>
             <a:r>
-              <a:rPr lang="en-US" b="1" dirty="0" smtClean="0">
+              <a:rPr lang="en-US" sz="1400" b="1" dirty="0" smtClean="0">
                 <a:solidFill>
                   <a:schemeClr val="accent3"/>
                 </a:solidFill>
@@ -42859,7 +42981,7 @@
               <a:t>/</a:t>
             </a:r>
             <a:r>
-              <a:rPr lang="en-US" b="1" dirty="0" err="1" smtClean="0">
+              <a:rPr lang="en-US" sz="1400" b="1" dirty="0" err="1" smtClean="0">
                 <a:solidFill>
                   <a:schemeClr val="accent3"/>
                 </a:solidFill>
@@ -42870,7 +42992,7 @@
               <a:t>vendored</a:t>
             </a:r>
             <a:r>
-              <a:rPr lang="en-US" b="1" dirty="0" smtClean="0">
+              <a:rPr lang="en-US" sz="1400" b="1" dirty="0" smtClean="0">
                 <a:solidFill>
                   <a:schemeClr val="accent3"/>
                 </a:solidFill>
@@ -42881,7 +43003,7 @@
               <a:t>/requests/</a:t>
             </a:r>
             <a:r>
-              <a:rPr lang="en-US" b="1" dirty="0" err="1" smtClean="0">
+              <a:rPr lang="en-US" sz="1400" b="1" dirty="0" err="1" smtClean="0">
                 <a:solidFill>
                   <a:schemeClr val="accent3"/>
                 </a:solidFill>
@@ -42892,7 +43014,7 @@
               <a:t>cacert.pem</a:t>
             </a:r>
             <a:r>
-              <a:rPr lang="en-US" b="1" dirty="0" smtClean="0">
+              <a:rPr lang="en-US" sz="1400" b="1" dirty="0" smtClean="0">
                 <a:solidFill>
                   <a:schemeClr val="accent3"/>
                 </a:solidFill>
@@ -42903,7 +43025,7 @@
               <a:t> (</a:t>
             </a:r>
             <a:r>
-              <a:rPr lang="en-US" b="1" dirty="0" err="1" smtClean="0">
+              <a:rPr lang="en-US" sz="1400" b="1" dirty="0" err="1" smtClean="0">
                 <a:solidFill>
                   <a:schemeClr val="accent3"/>
                 </a:solidFill>
@@ -42914,7 +43036,7 @@
               <a:t>CentOS</a:t>
             </a:r>
             <a:r>
-              <a:rPr lang="en-US" b="1" dirty="0" smtClean="0">
+              <a:rPr lang="en-US" sz="1400" b="1" dirty="0" smtClean="0">
                 <a:solidFill>
                   <a:schemeClr val="accent3"/>
                 </a:solidFill>
@@ -42925,7 +43047,7 @@
               <a:t>)</a:t>
             </a:r>
             <a:r>
-              <a:rPr lang="en-US" b="1" dirty="0">
+              <a:rPr lang="en-US" sz="1400" b="1" dirty="0">
                 <a:solidFill>
                   <a:schemeClr val="accent3"/>
                 </a:solidFill>
@@ -42936,7 +43058,7 @@
               <a:t/>
             </a:r>
             <a:br>
-              <a:rPr lang="en-US" b="1" dirty="0">
+              <a:rPr lang="en-US" sz="1400" b="1" dirty="0">
                 <a:solidFill>
                   <a:schemeClr val="accent3"/>
                 </a:solidFill>
@@ -42946,7 +43068,7 @@
               </a:rPr>
             </a:br>
             <a:r>
-              <a:rPr lang="en-US" b="1" dirty="0" smtClean="0">
+              <a:rPr lang="en-US" sz="1400" b="1" dirty="0" smtClean="0">
                 <a:solidFill>
                   <a:schemeClr val="accent3"/>
                 </a:solidFill>
@@ -42957,7 +43079,7 @@
               <a:t>/Library/Python/2.7/site-packages/</a:t>
             </a:r>
             <a:r>
-              <a:rPr lang="en-US" b="1" dirty="0" err="1" smtClean="0">
+              <a:rPr lang="en-US" sz="1400" b="1" dirty="0" err="1" smtClean="0">
                 <a:solidFill>
                   <a:schemeClr val="accent3"/>
                 </a:solidFill>
@@ -42968,7 +43090,7 @@
               <a:t>botocore</a:t>
             </a:r>
             <a:r>
-              <a:rPr lang="en-US" b="1" dirty="0" smtClean="0">
+              <a:rPr lang="en-US" sz="1400" b="1" dirty="0" smtClean="0">
                 <a:solidFill>
                   <a:schemeClr val="accent3"/>
                 </a:solidFill>
@@ -42979,7 +43101,7 @@
               <a:t>/</a:t>
             </a:r>
             <a:r>
-              <a:rPr lang="en-US" b="1" dirty="0" err="1" smtClean="0">
+              <a:rPr lang="en-US" sz="1400" b="1" dirty="0" err="1" smtClean="0">
                 <a:solidFill>
                   <a:schemeClr val="accent3"/>
                 </a:solidFill>
@@ -42990,7 +43112,7 @@
               <a:t>vendored</a:t>
             </a:r>
             <a:r>
-              <a:rPr lang="en-US" b="1" dirty="0" smtClean="0">
+              <a:rPr lang="en-US" sz="1400" b="1" dirty="0" smtClean="0">
                 <a:solidFill>
                   <a:schemeClr val="accent3"/>
                 </a:solidFill>
@@ -43001,7 +43123,7 @@
               <a:t>/requests/</a:t>
             </a:r>
             <a:r>
-              <a:rPr lang="en-US" b="1" dirty="0" err="1" smtClean="0">
+              <a:rPr lang="en-US" sz="1400" b="1" dirty="0" err="1" smtClean="0">
                 <a:solidFill>
                   <a:schemeClr val="accent3"/>
                 </a:solidFill>
@@ -43012,7 +43134,7 @@
               <a:t>cacert.pem</a:t>
             </a:r>
             <a:r>
-              <a:rPr lang="en-US" b="1" dirty="0" smtClean="0">
+              <a:rPr lang="en-US" sz="1400" b="1" dirty="0" smtClean="0">
                 <a:solidFill>
                   <a:schemeClr val="accent3"/>
                 </a:solidFill>
@@ -43023,7 +43145,7 @@
               <a:t> (Mac OS X</a:t>
             </a:r>
             <a:r>
-              <a:rPr lang="en-US" b="1" dirty="0">
+              <a:rPr lang="en-US" sz="1400" b="1" dirty="0">
                 <a:solidFill>
                   <a:schemeClr val="accent3"/>
                 </a:solidFill>
@@ -43034,7 +43156,7 @@
               <a:t>)</a:t>
             </a:r>
             <a:br>
-              <a:rPr lang="en-US" b="1" dirty="0">
+              <a:rPr lang="en-US" sz="1400" b="1" dirty="0">
                 <a:solidFill>
                   <a:schemeClr val="accent3"/>
                 </a:solidFill>
@@ -43044,7 +43166,7 @@
               </a:rPr>
             </a:br>
             <a:r>
-              <a:rPr lang="en-US" b="1" dirty="0">
+              <a:rPr lang="en-US" sz="1400" b="1" dirty="0">
                 <a:solidFill>
                   <a:schemeClr val="accent3"/>
                 </a:solidFill>
@@ -43055,7 +43177,7 @@
               <a:t>C:\Program </a:t>
             </a:r>
             <a:r>
-              <a:rPr lang="en-US" b="1" dirty="0" smtClean="0">
+              <a:rPr lang="en-US" sz="1400" b="1" dirty="0" smtClean="0">
                 <a:solidFill>
                   <a:schemeClr val="accent3"/>
                 </a:solidFill>
@@ -43066,7 +43188,7 @@
               <a:t>Files\Amazon\AWSCLI\</a:t>
             </a:r>
             <a:r>
-              <a:rPr lang="en-US" b="1" dirty="0" err="1" smtClean="0">
+              <a:rPr lang="en-US" sz="1400" b="1" dirty="0" err="1" smtClean="0">
                 <a:solidFill>
                   <a:schemeClr val="accent3"/>
                 </a:solidFill>
@@ -43077,7 +43199,7 @@
               <a:t>botocore</a:t>
             </a:r>
             <a:r>
-              <a:rPr lang="en-US" b="1" dirty="0" smtClean="0">
+              <a:rPr lang="en-US" sz="1400" b="1" dirty="0" smtClean="0">
                 <a:solidFill>
                   <a:schemeClr val="accent3"/>
                 </a:solidFill>
@@ -43088,7 +43210,7 @@
               <a:t>\</a:t>
             </a:r>
             <a:r>
-              <a:rPr lang="en-US" b="1" dirty="0" err="1" smtClean="0">
+              <a:rPr lang="en-US" sz="1400" b="1" dirty="0" err="1" smtClean="0">
                 <a:solidFill>
                   <a:schemeClr val="accent3"/>
                 </a:solidFill>
@@ -43099,7 +43221,7 @@
               <a:t>vendored</a:t>
             </a:r>
             <a:r>
-              <a:rPr lang="en-US" b="1" dirty="0" smtClean="0">
+              <a:rPr lang="en-US" sz="1400" b="1" dirty="0" smtClean="0">
                 <a:solidFill>
                   <a:schemeClr val="accent3"/>
                 </a:solidFill>
@@ -43110,7 +43232,7 @@
               <a:t>\requests\</a:t>
             </a:r>
             <a:r>
-              <a:rPr lang="en-US" b="1" dirty="0" err="1" smtClean="0">
+              <a:rPr lang="en-US" sz="1400" b="1" dirty="0" err="1" smtClean="0">
                 <a:solidFill>
                   <a:schemeClr val="accent3"/>
                 </a:solidFill>
@@ -43121,7 +43243,7 @@
               <a:t>cacert.pem</a:t>
             </a:r>
             <a:r>
-              <a:rPr lang="en-US" b="1" dirty="0" smtClean="0">
+              <a:rPr lang="en-US" sz="1400" b="1" dirty="0" smtClean="0">
                 <a:solidFill>
                   <a:schemeClr val="accent3"/>
                 </a:solidFill>
@@ -43131,7 +43253,7 @@
               </a:rPr>
               <a:t> (Windows)</a:t>
             </a:r>
-            <a:endParaRPr lang="en-US" b="1" dirty="0">
+            <a:endParaRPr lang="en-US" sz="1400" b="1" dirty="0">
               <a:solidFill>
                 <a:schemeClr val="accent3"/>
               </a:solidFill>
@@ -43157,7 +43279,7 @@
           <a:p>
             <a:pPr lvl="1"/>
             <a:r>
-              <a:rPr lang="en-US" b="1" dirty="0" smtClean="0">
+              <a:rPr lang="en-US" sz="1400" b="1" dirty="0" smtClean="0">
                 <a:solidFill>
                   <a:schemeClr val="accent3"/>
                 </a:solidFill>
@@ -43168,7 +43290,7 @@
               <a:t>~/.</a:t>
             </a:r>
             <a:r>
-              <a:rPr lang="en-US" b="1" dirty="0" err="1" smtClean="0">
+              <a:rPr lang="en-US" sz="1400" b="1" dirty="0" err="1" smtClean="0">
                 <a:solidFill>
                   <a:schemeClr val="accent3"/>
                 </a:solidFill>
@@ -43179,7 +43301,7 @@
               <a:t>aws</a:t>
             </a:r>
             <a:r>
-              <a:rPr lang="en-US" b="1" dirty="0" smtClean="0">
+              <a:rPr lang="en-US" sz="1400" b="1" dirty="0" smtClean="0">
                 <a:solidFill>
                   <a:schemeClr val="accent3"/>
                 </a:solidFill>
@@ -43190,7 +43312,7 @@
               <a:t>/</a:t>
             </a:r>
             <a:r>
-              <a:rPr lang="en-US" b="1" dirty="0" err="1" smtClean="0">
+              <a:rPr lang="en-US" sz="1400" b="1" dirty="0" err="1" smtClean="0">
                 <a:solidFill>
                   <a:schemeClr val="accent3"/>
                 </a:solidFill>
@@ -43200,7 +43322,7 @@
               </a:rPr>
               <a:t>config</a:t>
             </a:r>
-            <a:endParaRPr lang="en-US" b="1" dirty="0">
+            <a:endParaRPr lang="en-US" sz="1400" b="1" dirty="0">
               <a:solidFill>
                 <a:schemeClr val="accent3"/>
               </a:solidFill>
@@ -43223,7 +43345,7 @@
           <a:p>
             <a:pPr lvl="1"/>
             <a:r>
-              <a:rPr lang="en-US" b="1" dirty="0">
+              <a:rPr lang="en-US" sz="1400" b="1" dirty="0">
                 <a:solidFill>
                   <a:schemeClr val="accent3"/>
                 </a:solidFill>
@@ -43234,7 +43356,7 @@
               <a:t>~/.</a:t>
             </a:r>
             <a:r>
-              <a:rPr lang="en-US" b="1" dirty="0" err="1" smtClean="0">
+              <a:rPr lang="en-US" sz="1400" b="1" dirty="0" err="1" smtClean="0">
                 <a:solidFill>
                   <a:schemeClr val="accent3"/>
                 </a:solidFill>
@@ -43245,7 +43367,7 @@
               <a:t>aws</a:t>
             </a:r>
             <a:r>
-              <a:rPr lang="en-US" b="1" dirty="0" smtClean="0">
+              <a:rPr lang="en-US" sz="1400" b="1" dirty="0" smtClean="0">
                 <a:solidFill>
                   <a:schemeClr val="accent3"/>
                 </a:solidFill>
@@ -43255,7 +43377,7 @@
               </a:rPr>
               <a:t>/credentials</a:t>
             </a:r>
-            <a:endParaRPr lang="en-US" b="1" dirty="0">
+            <a:endParaRPr lang="en-US" sz="1400" b="1" dirty="0">
               <a:solidFill>
                 <a:schemeClr val="accent3"/>
               </a:solidFill>

</xml_diff>